<commit_message>
17 November 2024 update
</commit_message>
<xml_diff>
--- a/Antema/Antema 16.pptx
+++ b/Antema/Antema 16.pptx
@@ -141,7 +141,7 @@
           <p:cNvPr id="2" name="Titre 1">
             <a:extLst>
               <a:ext uri="{FF2B5EF4-FFF2-40B4-BE49-F238E27FC236}">
-                <a16:creationId xmlns:a16="http://schemas.microsoft.com/office/drawing/2014/main" id="{74307897-E2EB-367F-8E93-A5003B4C7850}"/>
+                <a16:creationId xmlns:a16="http://schemas.microsoft.com/office/drawing/2014/main" xmlns="" id="{74307897-E2EB-367F-8E93-A5003B4C7850}"/>
               </a:ext>
             </a:extLst>
           </p:cNvPr>
@@ -178,7 +178,7 @@
           <p:cNvPr id="3" name="Sous-titre 2">
             <a:extLst>
               <a:ext uri="{FF2B5EF4-FFF2-40B4-BE49-F238E27FC236}">
-                <a16:creationId xmlns:a16="http://schemas.microsoft.com/office/drawing/2014/main" id="{2F9D6D8D-836F-B19C-70CB-C6E3DBF756D4}"/>
+                <a16:creationId xmlns:a16="http://schemas.microsoft.com/office/drawing/2014/main" xmlns="" id="{2F9D6D8D-836F-B19C-70CB-C6E3DBF756D4}"/>
               </a:ext>
             </a:extLst>
           </p:cNvPr>
@@ -248,7 +248,7 @@
           <p:cNvPr id="4" name="Espace réservé de la date 3">
             <a:extLst>
               <a:ext uri="{FF2B5EF4-FFF2-40B4-BE49-F238E27FC236}">
-                <a16:creationId xmlns:a16="http://schemas.microsoft.com/office/drawing/2014/main" id="{976B0D7F-8E03-0846-061C-08BC80BC8502}"/>
+                <a16:creationId xmlns:a16="http://schemas.microsoft.com/office/drawing/2014/main" xmlns="" id="{976B0D7F-8E03-0846-061C-08BC80BC8502}"/>
               </a:ext>
             </a:extLst>
           </p:cNvPr>
@@ -266,7 +266,7 @@
           <a:p>
             <a:fld id="{C8A266F7-245B-4DBA-80AC-6E72B4EA9E8E}" type="datetimeFigureOut">
               <a:rPr lang="fr-FR" smtClean="0"/>
-              <a:t>12/05/2024</a:t>
+              <a:t>21/07/2024</a:t>
             </a:fld>
             <a:endParaRPr lang="fr-FR"/>
           </a:p>
@@ -277,7 +277,7 @@
           <p:cNvPr id="5" name="Espace réservé du pied de page 4">
             <a:extLst>
               <a:ext uri="{FF2B5EF4-FFF2-40B4-BE49-F238E27FC236}">
-                <a16:creationId xmlns:a16="http://schemas.microsoft.com/office/drawing/2014/main" id="{725102E4-D338-7076-A1E2-CF5F8107D557}"/>
+                <a16:creationId xmlns:a16="http://schemas.microsoft.com/office/drawing/2014/main" xmlns="" id="{725102E4-D338-7076-A1E2-CF5F8107D557}"/>
               </a:ext>
             </a:extLst>
           </p:cNvPr>
@@ -302,7 +302,7 @@
           <p:cNvPr id="6" name="Espace réservé du numéro de diapositive 5">
             <a:extLst>
               <a:ext uri="{FF2B5EF4-FFF2-40B4-BE49-F238E27FC236}">
-                <a16:creationId xmlns:a16="http://schemas.microsoft.com/office/drawing/2014/main" id="{FA4FE33A-ED33-CCF2-A7E6-25E3A88CAE46}"/>
+                <a16:creationId xmlns:a16="http://schemas.microsoft.com/office/drawing/2014/main" xmlns="" id="{FA4FE33A-ED33-CCF2-A7E6-25E3A88CAE46}"/>
               </a:ext>
             </a:extLst>
           </p:cNvPr>
@@ -361,7 +361,7 @@
           <p:cNvPr id="2" name="Titre 1">
             <a:extLst>
               <a:ext uri="{FF2B5EF4-FFF2-40B4-BE49-F238E27FC236}">
-                <a16:creationId xmlns:a16="http://schemas.microsoft.com/office/drawing/2014/main" id="{EB96134D-44D4-BC12-5AC8-27D1326F9FD6}"/>
+                <a16:creationId xmlns:a16="http://schemas.microsoft.com/office/drawing/2014/main" xmlns="" id="{EB96134D-44D4-BC12-5AC8-27D1326F9FD6}"/>
               </a:ext>
             </a:extLst>
           </p:cNvPr>
@@ -389,7 +389,7 @@
           <p:cNvPr id="3" name="Espace réservé du texte vertical 2">
             <a:extLst>
               <a:ext uri="{FF2B5EF4-FFF2-40B4-BE49-F238E27FC236}">
-                <a16:creationId xmlns:a16="http://schemas.microsoft.com/office/drawing/2014/main" id="{A532F1AD-C791-BF8E-415A-C776698CDF71}"/>
+                <a16:creationId xmlns:a16="http://schemas.microsoft.com/office/drawing/2014/main" xmlns="" id="{A532F1AD-C791-BF8E-415A-C776698CDF71}"/>
               </a:ext>
             </a:extLst>
           </p:cNvPr>
@@ -446,7 +446,7 @@
           <p:cNvPr id="4" name="Espace réservé de la date 3">
             <a:extLst>
               <a:ext uri="{FF2B5EF4-FFF2-40B4-BE49-F238E27FC236}">
-                <a16:creationId xmlns:a16="http://schemas.microsoft.com/office/drawing/2014/main" id="{EDDEA578-FE1C-5B44-EE1B-61603D7CA102}"/>
+                <a16:creationId xmlns:a16="http://schemas.microsoft.com/office/drawing/2014/main" xmlns="" id="{EDDEA578-FE1C-5B44-EE1B-61603D7CA102}"/>
               </a:ext>
             </a:extLst>
           </p:cNvPr>
@@ -464,7 +464,7 @@
           <a:p>
             <a:fld id="{C8A266F7-245B-4DBA-80AC-6E72B4EA9E8E}" type="datetimeFigureOut">
               <a:rPr lang="fr-FR" smtClean="0"/>
-              <a:t>12/05/2024</a:t>
+              <a:t>21/07/2024</a:t>
             </a:fld>
             <a:endParaRPr lang="fr-FR"/>
           </a:p>
@@ -475,7 +475,7 @@
           <p:cNvPr id="5" name="Espace réservé du pied de page 4">
             <a:extLst>
               <a:ext uri="{FF2B5EF4-FFF2-40B4-BE49-F238E27FC236}">
-                <a16:creationId xmlns:a16="http://schemas.microsoft.com/office/drawing/2014/main" id="{5A22403B-6D12-CD24-6455-A3B9BBB43038}"/>
+                <a16:creationId xmlns:a16="http://schemas.microsoft.com/office/drawing/2014/main" xmlns="" id="{5A22403B-6D12-CD24-6455-A3B9BBB43038}"/>
               </a:ext>
             </a:extLst>
           </p:cNvPr>
@@ -500,7 +500,7 @@
           <p:cNvPr id="6" name="Espace réservé du numéro de diapositive 5">
             <a:extLst>
               <a:ext uri="{FF2B5EF4-FFF2-40B4-BE49-F238E27FC236}">
-                <a16:creationId xmlns:a16="http://schemas.microsoft.com/office/drawing/2014/main" id="{26445B70-F6CF-86FF-7957-8297A91433B9}"/>
+                <a16:creationId xmlns:a16="http://schemas.microsoft.com/office/drawing/2014/main" xmlns="" id="{26445B70-F6CF-86FF-7957-8297A91433B9}"/>
               </a:ext>
             </a:extLst>
           </p:cNvPr>
@@ -559,7 +559,7 @@
           <p:cNvPr id="2" name="Titre vertical 1">
             <a:extLst>
               <a:ext uri="{FF2B5EF4-FFF2-40B4-BE49-F238E27FC236}">
-                <a16:creationId xmlns:a16="http://schemas.microsoft.com/office/drawing/2014/main" id="{35DEDD39-EA50-C09B-8ECF-9C1566BA640E}"/>
+                <a16:creationId xmlns:a16="http://schemas.microsoft.com/office/drawing/2014/main" xmlns="" id="{35DEDD39-EA50-C09B-8ECF-9C1566BA640E}"/>
               </a:ext>
             </a:extLst>
           </p:cNvPr>
@@ -592,7 +592,7 @@
           <p:cNvPr id="3" name="Espace réservé du texte vertical 2">
             <a:extLst>
               <a:ext uri="{FF2B5EF4-FFF2-40B4-BE49-F238E27FC236}">
-                <a16:creationId xmlns:a16="http://schemas.microsoft.com/office/drawing/2014/main" id="{752DBE9F-DA5B-902F-331C-EEB09FB13ECF}"/>
+                <a16:creationId xmlns:a16="http://schemas.microsoft.com/office/drawing/2014/main" xmlns="" id="{752DBE9F-DA5B-902F-331C-EEB09FB13ECF}"/>
               </a:ext>
             </a:extLst>
           </p:cNvPr>
@@ -654,7 +654,7 @@
           <p:cNvPr id="4" name="Espace réservé de la date 3">
             <a:extLst>
               <a:ext uri="{FF2B5EF4-FFF2-40B4-BE49-F238E27FC236}">
-                <a16:creationId xmlns:a16="http://schemas.microsoft.com/office/drawing/2014/main" id="{CB223AB3-6C6E-8CFF-33D9-501153542E74}"/>
+                <a16:creationId xmlns:a16="http://schemas.microsoft.com/office/drawing/2014/main" xmlns="" id="{CB223AB3-6C6E-8CFF-33D9-501153542E74}"/>
               </a:ext>
             </a:extLst>
           </p:cNvPr>
@@ -672,7 +672,7 @@
           <a:p>
             <a:fld id="{C8A266F7-245B-4DBA-80AC-6E72B4EA9E8E}" type="datetimeFigureOut">
               <a:rPr lang="fr-FR" smtClean="0"/>
-              <a:t>12/05/2024</a:t>
+              <a:t>21/07/2024</a:t>
             </a:fld>
             <a:endParaRPr lang="fr-FR"/>
           </a:p>
@@ -683,7 +683,7 @@
           <p:cNvPr id="5" name="Espace réservé du pied de page 4">
             <a:extLst>
               <a:ext uri="{FF2B5EF4-FFF2-40B4-BE49-F238E27FC236}">
-                <a16:creationId xmlns:a16="http://schemas.microsoft.com/office/drawing/2014/main" id="{34379824-33A6-3D40-BA9F-2090070A310E}"/>
+                <a16:creationId xmlns:a16="http://schemas.microsoft.com/office/drawing/2014/main" xmlns="" id="{34379824-33A6-3D40-BA9F-2090070A310E}"/>
               </a:ext>
             </a:extLst>
           </p:cNvPr>
@@ -708,7 +708,7 @@
           <p:cNvPr id="6" name="Espace réservé du numéro de diapositive 5">
             <a:extLst>
               <a:ext uri="{FF2B5EF4-FFF2-40B4-BE49-F238E27FC236}">
-                <a16:creationId xmlns:a16="http://schemas.microsoft.com/office/drawing/2014/main" id="{7B2FAF2E-B582-76F3-013A-267EAA5243FA}"/>
+                <a16:creationId xmlns:a16="http://schemas.microsoft.com/office/drawing/2014/main" xmlns="" id="{7B2FAF2E-B582-76F3-013A-267EAA5243FA}"/>
               </a:ext>
             </a:extLst>
           </p:cNvPr>
@@ -767,7 +767,7 @@
           <p:cNvPr id="2" name="Titre 1">
             <a:extLst>
               <a:ext uri="{FF2B5EF4-FFF2-40B4-BE49-F238E27FC236}">
-                <a16:creationId xmlns:a16="http://schemas.microsoft.com/office/drawing/2014/main" id="{A0BD4FA7-1737-5142-C685-D0D823CB449A}"/>
+                <a16:creationId xmlns:a16="http://schemas.microsoft.com/office/drawing/2014/main" xmlns="" id="{A0BD4FA7-1737-5142-C685-D0D823CB449A}"/>
               </a:ext>
             </a:extLst>
           </p:cNvPr>
@@ -795,7 +795,7 @@
           <p:cNvPr id="3" name="Espace réservé du contenu 2">
             <a:extLst>
               <a:ext uri="{FF2B5EF4-FFF2-40B4-BE49-F238E27FC236}">
-                <a16:creationId xmlns:a16="http://schemas.microsoft.com/office/drawing/2014/main" id="{DA8531C6-1EF4-324D-53F9-32958198B88D}"/>
+                <a16:creationId xmlns:a16="http://schemas.microsoft.com/office/drawing/2014/main" xmlns="" id="{DA8531C6-1EF4-324D-53F9-32958198B88D}"/>
               </a:ext>
             </a:extLst>
           </p:cNvPr>
@@ -852,7 +852,7 @@
           <p:cNvPr id="4" name="Espace réservé de la date 3">
             <a:extLst>
               <a:ext uri="{FF2B5EF4-FFF2-40B4-BE49-F238E27FC236}">
-                <a16:creationId xmlns:a16="http://schemas.microsoft.com/office/drawing/2014/main" id="{72FE4141-3205-4EDE-E88E-0899EC1E7891}"/>
+                <a16:creationId xmlns:a16="http://schemas.microsoft.com/office/drawing/2014/main" xmlns="" id="{72FE4141-3205-4EDE-E88E-0899EC1E7891}"/>
               </a:ext>
             </a:extLst>
           </p:cNvPr>
@@ -870,7 +870,7 @@
           <a:p>
             <a:fld id="{C8A266F7-245B-4DBA-80AC-6E72B4EA9E8E}" type="datetimeFigureOut">
               <a:rPr lang="fr-FR" smtClean="0"/>
-              <a:t>12/05/2024</a:t>
+              <a:t>21/07/2024</a:t>
             </a:fld>
             <a:endParaRPr lang="fr-FR"/>
           </a:p>
@@ -881,7 +881,7 @@
           <p:cNvPr id="5" name="Espace réservé du pied de page 4">
             <a:extLst>
               <a:ext uri="{FF2B5EF4-FFF2-40B4-BE49-F238E27FC236}">
-                <a16:creationId xmlns:a16="http://schemas.microsoft.com/office/drawing/2014/main" id="{5C588421-71CF-1001-053F-4B62BE58417E}"/>
+                <a16:creationId xmlns:a16="http://schemas.microsoft.com/office/drawing/2014/main" xmlns="" id="{5C588421-71CF-1001-053F-4B62BE58417E}"/>
               </a:ext>
             </a:extLst>
           </p:cNvPr>
@@ -906,7 +906,7 @@
           <p:cNvPr id="6" name="Espace réservé du numéro de diapositive 5">
             <a:extLst>
               <a:ext uri="{FF2B5EF4-FFF2-40B4-BE49-F238E27FC236}">
-                <a16:creationId xmlns:a16="http://schemas.microsoft.com/office/drawing/2014/main" id="{EC3C32D8-32A5-A7E8-AB57-F2C85376D746}"/>
+                <a16:creationId xmlns:a16="http://schemas.microsoft.com/office/drawing/2014/main" xmlns="" id="{EC3C32D8-32A5-A7E8-AB57-F2C85376D746}"/>
               </a:ext>
             </a:extLst>
           </p:cNvPr>
@@ -965,7 +965,7 @@
           <p:cNvPr id="2" name="Titre 1">
             <a:extLst>
               <a:ext uri="{FF2B5EF4-FFF2-40B4-BE49-F238E27FC236}">
-                <a16:creationId xmlns:a16="http://schemas.microsoft.com/office/drawing/2014/main" id="{50E94CE6-8560-CA38-DF2B-172681CC0420}"/>
+                <a16:creationId xmlns:a16="http://schemas.microsoft.com/office/drawing/2014/main" xmlns="" id="{50E94CE6-8560-CA38-DF2B-172681CC0420}"/>
               </a:ext>
             </a:extLst>
           </p:cNvPr>
@@ -1002,7 +1002,7 @@
           <p:cNvPr id="3" name="Espace réservé du texte 2">
             <a:extLst>
               <a:ext uri="{FF2B5EF4-FFF2-40B4-BE49-F238E27FC236}">
-                <a16:creationId xmlns:a16="http://schemas.microsoft.com/office/drawing/2014/main" id="{D483FDDA-EF37-AE6D-6992-F9132E7185FD}"/>
+                <a16:creationId xmlns:a16="http://schemas.microsoft.com/office/drawing/2014/main" xmlns="" id="{D483FDDA-EF37-AE6D-6992-F9132E7185FD}"/>
               </a:ext>
             </a:extLst>
           </p:cNvPr>
@@ -1127,7 +1127,7 @@
           <p:cNvPr id="4" name="Espace réservé de la date 3">
             <a:extLst>
               <a:ext uri="{FF2B5EF4-FFF2-40B4-BE49-F238E27FC236}">
-                <a16:creationId xmlns:a16="http://schemas.microsoft.com/office/drawing/2014/main" id="{33B7DEBA-3BF2-445A-77AA-84B6486FEAFB}"/>
+                <a16:creationId xmlns:a16="http://schemas.microsoft.com/office/drawing/2014/main" xmlns="" id="{33B7DEBA-3BF2-445A-77AA-84B6486FEAFB}"/>
               </a:ext>
             </a:extLst>
           </p:cNvPr>
@@ -1145,7 +1145,7 @@
           <a:p>
             <a:fld id="{C8A266F7-245B-4DBA-80AC-6E72B4EA9E8E}" type="datetimeFigureOut">
               <a:rPr lang="fr-FR" smtClean="0"/>
-              <a:t>12/05/2024</a:t>
+              <a:t>21/07/2024</a:t>
             </a:fld>
             <a:endParaRPr lang="fr-FR"/>
           </a:p>
@@ -1156,7 +1156,7 @@
           <p:cNvPr id="5" name="Espace réservé du pied de page 4">
             <a:extLst>
               <a:ext uri="{FF2B5EF4-FFF2-40B4-BE49-F238E27FC236}">
-                <a16:creationId xmlns:a16="http://schemas.microsoft.com/office/drawing/2014/main" id="{A6D9C0CA-64C2-C304-52AC-87A63D7F351D}"/>
+                <a16:creationId xmlns:a16="http://schemas.microsoft.com/office/drawing/2014/main" xmlns="" id="{A6D9C0CA-64C2-C304-52AC-87A63D7F351D}"/>
               </a:ext>
             </a:extLst>
           </p:cNvPr>
@@ -1181,7 +1181,7 @@
           <p:cNvPr id="6" name="Espace réservé du numéro de diapositive 5">
             <a:extLst>
               <a:ext uri="{FF2B5EF4-FFF2-40B4-BE49-F238E27FC236}">
-                <a16:creationId xmlns:a16="http://schemas.microsoft.com/office/drawing/2014/main" id="{3582D00E-61DD-9B19-1144-319E247405AB}"/>
+                <a16:creationId xmlns:a16="http://schemas.microsoft.com/office/drawing/2014/main" xmlns="" id="{3582D00E-61DD-9B19-1144-319E247405AB}"/>
               </a:ext>
             </a:extLst>
           </p:cNvPr>
@@ -1240,7 +1240,7 @@
           <p:cNvPr id="2" name="Titre 1">
             <a:extLst>
               <a:ext uri="{FF2B5EF4-FFF2-40B4-BE49-F238E27FC236}">
-                <a16:creationId xmlns:a16="http://schemas.microsoft.com/office/drawing/2014/main" id="{51878E56-0C5F-3869-4232-18889CC6266C}"/>
+                <a16:creationId xmlns:a16="http://schemas.microsoft.com/office/drawing/2014/main" xmlns="" id="{51878E56-0C5F-3869-4232-18889CC6266C}"/>
               </a:ext>
             </a:extLst>
           </p:cNvPr>
@@ -1268,7 +1268,7 @@
           <p:cNvPr id="3" name="Espace réservé du contenu 2">
             <a:extLst>
               <a:ext uri="{FF2B5EF4-FFF2-40B4-BE49-F238E27FC236}">
-                <a16:creationId xmlns:a16="http://schemas.microsoft.com/office/drawing/2014/main" id="{A55AFA51-77EA-1B98-2DA7-69059595B0A8}"/>
+                <a16:creationId xmlns:a16="http://schemas.microsoft.com/office/drawing/2014/main" xmlns="" id="{A55AFA51-77EA-1B98-2DA7-69059595B0A8}"/>
               </a:ext>
             </a:extLst>
           </p:cNvPr>
@@ -1330,7 +1330,7 @@
           <p:cNvPr id="4" name="Espace réservé du contenu 3">
             <a:extLst>
               <a:ext uri="{FF2B5EF4-FFF2-40B4-BE49-F238E27FC236}">
-                <a16:creationId xmlns:a16="http://schemas.microsoft.com/office/drawing/2014/main" id="{C2A7595B-3DCC-9407-E5BF-E3398F2802FD}"/>
+                <a16:creationId xmlns:a16="http://schemas.microsoft.com/office/drawing/2014/main" xmlns="" id="{C2A7595B-3DCC-9407-E5BF-E3398F2802FD}"/>
               </a:ext>
             </a:extLst>
           </p:cNvPr>
@@ -1392,7 +1392,7 @@
           <p:cNvPr id="5" name="Espace réservé de la date 4">
             <a:extLst>
               <a:ext uri="{FF2B5EF4-FFF2-40B4-BE49-F238E27FC236}">
-                <a16:creationId xmlns:a16="http://schemas.microsoft.com/office/drawing/2014/main" id="{93C51F55-0990-1EBB-3D9A-EFCD9514DDA0}"/>
+                <a16:creationId xmlns:a16="http://schemas.microsoft.com/office/drawing/2014/main" xmlns="" id="{93C51F55-0990-1EBB-3D9A-EFCD9514DDA0}"/>
               </a:ext>
             </a:extLst>
           </p:cNvPr>
@@ -1410,7 +1410,7 @@
           <a:p>
             <a:fld id="{C8A266F7-245B-4DBA-80AC-6E72B4EA9E8E}" type="datetimeFigureOut">
               <a:rPr lang="fr-FR" smtClean="0"/>
-              <a:t>12/05/2024</a:t>
+              <a:t>21/07/2024</a:t>
             </a:fld>
             <a:endParaRPr lang="fr-FR"/>
           </a:p>
@@ -1421,7 +1421,7 @@
           <p:cNvPr id="6" name="Espace réservé du pied de page 5">
             <a:extLst>
               <a:ext uri="{FF2B5EF4-FFF2-40B4-BE49-F238E27FC236}">
-                <a16:creationId xmlns:a16="http://schemas.microsoft.com/office/drawing/2014/main" id="{7FE63C56-94E7-F8D6-810C-07124C397FAA}"/>
+                <a16:creationId xmlns:a16="http://schemas.microsoft.com/office/drawing/2014/main" xmlns="" id="{7FE63C56-94E7-F8D6-810C-07124C397FAA}"/>
               </a:ext>
             </a:extLst>
           </p:cNvPr>
@@ -1446,7 +1446,7 @@
           <p:cNvPr id="7" name="Espace réservé du numéro de diapositive 6">
             <a:extLst>
               <a:ext uri="{FF2B5EF4-FFF2-40B4-BE49-F238E27FC236}">
-                <a16:creationId xmlns:a16="http://schemas.microsoft.com/office/drawing/2014/main" id="{6EF0B631-9F15-603A-DAC0-E7F1DD3B00A1}"/>
+                <a16:creationId xmlns:a16="http://schemas.microsoft.com/office/drawing/2014/main" xmlns="" id="{6EF0B631-9F15-603A-DAC0-E7F1DD3B00A1}"/>
               </a:ext>
             </a:extLst>
           </p:cNvPr>
@@ -1505,7 +1505,7 @@
           <p:cNvPr id="2" name="Titre 1">
             <a:extLst>
               <a:ext uri="{FF2B5EF4-FFF2-40B4-BE49-F238E27FC236}">
-                <a16:creationId xmlns:a16="http://schemas.microsoft.com/office/drawing/2014/main" id="{2852C58A-A27A-67F7-465D-825F1C1BAE67}"/>
+                <a16:creationId xmlns:a16="http://schemas.microsoft.com/office/drawing/2014/main" xmlns="" id="{2852C58A-A27A-67F7-465D-825F1C1BAE67}"/>
               </a:ext>
             </a:extLst>
           </p:cNvPr>
@@ -1538,7 +1538,7 @@
           <p:cNvPr id="3" name="Espace réservé du texte 2">
             <a:extLst>
               <a:ext uri="{FF2B5EF4-FFF2-40B4-BE49-F238E27FC236}">
-                <a16:creationId xmlns:a16="http://schemas.microsoft.com/office/drawing/2014/main" id="{A96FC6BD-C51C-CDAD-8A5F-6AC6D312FB9D}"/>
+                <a16:creationId xmlns:a16="http://schemas.microsoft.com/office/drawing/2014/main" xmlns="" id="{A96FC6BD-C51C-CDAD-8A5F-6AC6D312FB9D}"/>
               </a:ext>
             </a:extLst>
           </p:cNvPr>
@@ -1609,7 +1609,7 @@
           <p:cNvPr id="4" name="Espace réservé du contenu 3">
             <a:extLst>
               <a:ext uri="{FF2B5EF4-FFF2-40B4-BE49-F238E27FC236}">
-                <a16:creationId xmlns:a16="http://schemas.microsoft.com/office/drawing/2014/main" id="{2EDCEBC3-7254-B054-4178-68EB0F3110A0}"/>
+                <a16:creationId xmlns:a16="http://schemas.microsoft.com/office/drawing/2014/main" xmlns="" id="{2EDCEBC3-7254-B054-4178-68EB0F3110A0}"/>
               </a:ext>
             </a:extLst>
           </p:cNvPr>
@@ -1671,7 +1671,7 @@
           <p:cNvPr id="5" name="Espace réservé du texte 4">
             <a:extLst>
               <a:ext uri="{FF2B5EF4-FFF2-40B4-BE49-F238E27FC236}">
-                <a16:creationId xmlns:a16="http://schemas.microsoft.com/office/drawing/2014/main" id="{26A8E4F9-4CBD-0EB1-6B7B-3364B4F0C795}"/>
+                <a16:creationId xmlns:a16="http://schemas.microsoft.com/office/drawing/2014/main" xmlns="" id="{26A8E4F9-4CBD-0EB1-6B7B-3364B4F0C795}"/>
               </a:ext>
             </a:extLst>
           </p:cNvPr>
@@ -1742,7 +1742,7 @@
           <p:cNvPr id="6" name="Espace réservé du contenu 5">
             <a:extLst>
               <a:ext uri="{FF2B5EF4-FFF2-40B4-BE49-F238E27FC236}">
-                <a16:creationId xmlns:a16="http://schemas.microsoft.com/office/drawing/2014/main" id="{E167693E-1C14-7379-7385-1D5829FDACF3}"/>
+                <a16:creationId xmlns:a16="http://schemas.microsoft.com/office/drawing/2014/main" xmlns="" id="{E167693E-1C14-7379-7385-1D5829FDACF3}"/>
               </a:ext>
             </a:extLst>
           </p:cNvPr>
@@ -1804,7 +1804,7 @@
           <p:cNvPr id="7" name="Espace réservé de la date 6">
             <a:extLst>
               <a:ext uri="{FF2B5EF4-FFF2-40B4-BE49-F238E27FC236}">
-                <a16:creationId xmlns:a16="http://schemas.microsoft.com/office/drawing/2014/main" id="{DA24AD9F-A75F-9E7A-3AED-09767B8C6024}"/>
+                <a16:creationId xmlns:a16="http://schemas.microsoft.com/office/drawing/2014/main" xmlns="" id="{DA24AD9F-A75F-9E7A-3AED-09767B8C6024}"/>
               </a:ext>
             </a:extLst>
           </p:cNvPr>
@@ -1822,7 +1822,7 @@
           <a:p>
             <a:fld id="{C8A266F7-245B-4DBA-80AC-6E72B4EA9E8E}" type="datetimeFigureOut">
               <a:rPr lang="fr-FR" smtClean="0"/>
-              <a:t>12/05/2024</a:t>
+              <a:t>21/07/2024</a:t>
             </a:fld>
             <a:endParaRPr lang="fr-FR"/>
           </a:p>
@@ -1833,7 +1833,7 @@
           <p:cNvPr id="8" name="Espace réservé du pied de page 7">
             <a:extLst>
               <a:ext uri="{FF2B5EF4-FFF2-40B4-BE49-F238E27FC236}">
-                <a16:creationId xmlns:a16="http://schemas.microsoft.com/office/drawing/2014/main" id="{DCFA45BE-54E3-9B33-A2D4-4FEE34DA5A07}"/>
+                <a16:creationId xmlns:a16="http://schemas.microsoft.com/office/drawing/2014/main" xmlns="" id="{DCFA45BE-54E3-9B33-A2D4-4FEE34DA5A07}"/>
               </a:ext>
             </a:extLst>
           </p:cNvPr>
@@ -1858,7 +1858,7 @@
           <p:cNvPr id="9" name="Espace réservé du numéro de diapositive 8">
             <a:extLst>
               <a:ext uri="{FF2B5EF4-FFF2-40B4-BE49-F238E27FC236}">
-                <a16:creationId xmlns:a16="http://schemas.microsoft.com/office/drawing/2014/main" id="{07791731-CE43-D21D-7652-7F2DF6060F05}"/>
+                <a16:creationId xmlns:a16="http://schemas.microsoft.com/office/drawing/2014/main" xmlns="" id="{07791731-CE43-D21D-7652-7F2DF6060F05}"/>
               </a:ext>
             </a:extLst>
           </p:cNvPr>
@@ -1917,7 +1917,7 @@
           <p:cNvPr id="2" name="Titre 1">
             <a:extLst>
               <a:ext uri="{FF2B5EF4-FFF2-40B4-BE49-F238E27FC236}">
-                <a16:creationId xmlns:a16="http://schemas.microsoft.com/office/drawing/2014/main" id="{78BE8677-4826-F1D0-F0C9-1CC5C0ECAED0}"/>
+                <a16:creationId xmlns:a16="http://schemas.microsoft.com/office/drawing/2014/main" xmlns="" id="{78BE8677-4826-F1D0-F0C9-1CC5C0ECAED0}"/>
               </a:ext>
             </a:extLst>
           </p:cNvPr>
@@ -1945,7 +1945,7 @@
           <p:cNvPr id="3" name="Espace réservé de la date 2">
             <a:extLst>
               <a:ext uri="{FF2B5EF4-FFF2-40B4-BE49-F238E27FC236}">
-                <a16:creationId xmlns:a16="http://schemas.microsoft.com/office/drawing/2014/main" id="{79D3D1D6-23F3-FC18-18B5-5FD0E6ACAA26}"/>
+                <a16:creationId xmlns:a16="http://schemas.microsoft.com/office/drawing/2014/main" xmlns="" id="{79D3D1D6-23F3-FC18-18B5-5FD0E6ACAA26}"/>
               </a:ext>
             </a:extLst>
           </p:cNvPr>
@@ -1963,7 +1963,7 @@
           <a:p>
             <a:fld id="{C8A266F7-245B-4DBA-80AC-6E72B4EA9E8E}" type="datetimeFigureOut">
               <a:rPr lang="fr-FR" smtClean="0"/>
-              <a:t>12/05/2024</a:t>
+              <a:t>21/07/2024</a:t>
             </a:fld>
             <a:endParaRPr lang="fr-FR"/>
           </a:p>
@@ -1974,7 +1974,7 @@
           <p:cNvPr id="4" name="Espace réservé du pied de page 3">
             <a:extLst>
               <a:ext uri="{FF2B5EF4-FFF2-40B4-BE49-F238E27FC236}">
-                <a16:creationId xmlns:a16="http://schemas.microsoft.com/office/drawing/2014/main" id="{12E8359F-FA91-D362-5700-A3B5227E5E86}"/>
+                <a16:creationId xmlns:a16="http://schemas.microsoft.com/office/drawing/2014/main" xmlns="" id="{12E8359F-FA91-D362-5700-A3B5227E5E86}"/>
               </a:ext>
             </a:extLst>
           </p:cNvPr>
@@ -1999,7 +1999,7 @@
           <p:cNvPr id="5" name="Espace réservé du numéro de diapositive 4">
             <a:extLst>
               <a:ext uri="{FF2B5EF4-FFF2-40B4-BE49-F238E27FC236}">
-                <a16:creationId xmlns:a16="http://schemas.microsoft.com/office/drawing/2014/main" id="{D171D6C6-4938-4EF0-86DB-7DA86506F32F}"/>
+                <a16:creationId xmlns:a16="http://schemas.microsoft.com/office/drawing/2014/main" xmlns="" id="{D171D6C6-4938-4EF0-86DB-7DA86506F32F}"/>
               </a:ext>
             </a:extLst>
           </p:cNvPr>
@@ -2058,7 +2058,7 @@
           <p:cNvPr id="2" name="Espace réservé de la date 1">
             <a:extLst>
               <a:ext uri="{FF2B5EF4-FFF2-40B4-BE49-F238E27FC236}">
-                <a16:creationId xmlns:a16="http://schemas.microsoft.com/office/drawing/2014/main" id="{594982E9-46BA-827E-B558-3D01C99201F1}"/>
+                <a16:creationId xmlns:a16="http://schemas.microsoft.com/office/drawing/2014/main" xmlns="" id="{594982E9-46BA-827E-B558-3D01C99201F1}"/>
               </a:ext>
             </a:extLst>
           </p:cNvPr>
@@ -2076,7 +2076,7 @@
           <a:p>
             <a:fld id="{C8A266F7-245B-4DBA-80AC-6E72B4EA9E8E}" type="datetimeFigureOut">
               <a:rPr lang="fr-FR" smtClean="0"/>
-              <a:t>12/05/2024</a:t>
+              <a:t>21/07/2024</a:t>
             </a:fld>
             <a:endParaRPr lang="fr-FR"/>
           </a:p>
@@ -2087,7 +2087,7 @@
           <p:cNvPr id="3" name="Espace réservé du pied de page 2">
             <a:extLst>
               <a:ext uri="{FF2B5EF4-FFF2-40B4-BE49-F238E27FC236}">
-                <a16:creationId xmlns:a16="http://schemas.microsoft.com/office/drawing/2014/main" id="{12279F5F-086B-02F1-934B-495CA6D00992}"/>
+                <a16:creationId xmlns:a16="http://schemas.microsoft.com/office/drawing/2014/main" xmlns="" id="{12279F5F-086B-02F1-934B-495CA6D00992}"/>
               </a:ext>
             </a:extLst>
           </p:cNvPr>
@@ -2112,7 +2112,7 @@
           <p:cNvPr id="4" name="Espace réservé du numéro de diapositive 3">
             <a:extLst>
               <a:ext uri="{FF2B5EF4-FFF2-40B4-BE49-F238E27FC236}">
-                <a16:creationId xmlns:a16="http://schemas.microsoft.com/office/drawing/2014/main" id="{3C91A9C3-0F2D-DE83-4B34-71410F8DEC8F}"/>
+                <a16:creationId xmlns:a16="http://schemas.microsoft.com/office/drawing/2014/main" xmlns="" id="{3C91A9C3-0F2D-DE83-4B34-71410F8DEC8F}"/>
               </a:ext>
             </a:extLst>
           </p:cNvPr>
@@ -2171,7 +2171,7 @@
           <p:cNvPr id="2" name="Titre 1">
             <a:extLst>
               <a:ext uri="{FF2B5EF4-FFF2-40B4-BE49-F238E27FC236}">
-                <a16:creationId xmlns:a16="http://schemas.microsoft.com/office/drawing/2014/main" id="{C1E5BDA9-E601-1297-4565-59CC04B28D01}"/>
+                <a16:creationId xmlns:a16="http://schemas.microsoft.com/office/drawing/2014/main" xmlns="" id="{C1E5BDA9-E601-1297-4565-59CC04B28D01}"/>
               </a:ext>
             </a:extLst>
           </p:cNvPr>
@@ -2208,7 +2208,7 @@
           <p:cNvPr id="3" name="Espace réservé du contenu 2">
             <a:extLst>
               <a:ext uri="{FF2B5EF4-FFF2-40B4-BE49-F238E27FC236}">
-                <a16:creationId xmlns:a16="http://schemas.microsoft.com/office/drawing/2014/main" id="{5B51DA29-CCEA-5B12-C5F5-BC935271BFF0}"/>
+                <a16:creationId xmlns:a16="http://schemas.microsoft.com/office/drawing/2014/main" xmlns="" id="{5B51DA29-CCEA-5B12-C5F5-BC935271BFF0}"/>
               </a:ext>
             </a:extLst>
           </p:cNvPr>
@@ -2298,7 +2298,7 @@
           <p:cNvPr id="4" name="Espace réservé du texte 3">
             <a:extLst>
               <a:ext uri="{FF2B5EF4-FFF2-40B4-BE49-F238E27FC236}">
-                <a16:creationId xmlns:a16="http://schemas.microsoft.com/office/drawing/2014/main" id="{98F334C6-F37E-C960-3FD7-4B42FF0D73A6}"/>
+                <a16:creationId xmlns:a16="http://schemas.microsoft.com/office/drawing/2014/main" xmlns="" id="{98F334C6-F37E-C960-3FD7-4B42FF0D73A6}"/>
               </a:ext>
             </a:extLst>
           </p:cNvPr>
@@ -2369,7 +2369,7 @@
           <p:cNvPr id="5" name="Espace réservé de la date 4">
             <a:extLst>
               <a:ext uri="{FF2B5EF4-FFF2-40B4-BE49-F238E27FC236}">
-                <a16:creationId xmlns:a16="http://schemas.microsoft.com/office/drawing/2014/main" id="{0FA8AE15-5614-0A8A-148F-7486E5DDD622}"/>
+                <a16:creationId xmlns:a16="http://schemas.microsoft.com/office/drawing/2014/main" xmlns="" id="{0FA8AE15-5614-0A8A-148F-7486E5DDD622}"/>
               </a:ext>
             </a:extLst>
           </p:cNvPr>
@@ -2387,7 +2387,7 @@
           <a:p>
             <a:fld id="{C8A266F7-245B-4DBA-80AC-6E72B4EA9E8E}" type="datetimeFigureOut">
               <a:rPr lang="fr-FR" smtClean="0"/>
-              <a:t>12/05/2024</a:t>
+              <a:t>21/07/2024</a:t>
             </a:fld>
             <a:endParaRPr lang="fr-FR"/>
           </a:p>
@@ -2398,7 +2398,7 @@
           <p:cNvPr id="6" name="Espace réservé du pied de page 5">
             <a:extLst>
               <a:ext uri="{FF2B5EF4-FFF2-40B4-BE49-F238E27FC236}">
-                <a16:creationId xmlns:a16="http://schemas.microsoft.com/office/drawing/2014/main" id="{38BD237C-42BC-6ED7-5A37-B5D92DCC9E06}"/>
+                <a16:creationId xmlns:a16="http://schemas.microsoft.com/office/drawing/2014/main" xmlns="" id="{38BD237C-42BC-6ED7-5A37-B5D92DCC9E06}"/>
               </a:ext>
             </a:extLst>
           </p:cNvPr>
@@ -2423,7 +2423,7 @@
           <p:cNvPr id="7" name="Espace réservé du numéro de diapositive 6">
             <a:extLst>
               <a:ext uri="{FF2B5EF4-FFF2-40B4-BE49-F238E27FC236}">
-                <a16:creationId xmlns:a16="http://schemas.microsoft.com/office/drawing/2014/main" id="{B9D94C58-12AC-AEBB-C6ED-EF7D6E9AB790}"/>
+                <a16:creationId xmlns:a16="http://schemas.microsoft.com/office/drawing/2014/main" xmlns="" id="{B9D94C58-12AC-AEBB-C6ED-EF7D6E9AB790}"/>
               </a:ext>
             </a:extLst>
           </p:cNvPr>
@@ -2482,7 +2482,7 @@
           <p:cNvPr id="2" name="Titre 1">
             <a:extLst>
               <a:ext uri="{FF2B5EF4-FFF2-40B4-BE49-F238E27FC236}">
-                <a16:creationId xmlns:a16="http://schemas.microsoft.com/office/drawing/2014/main" id="{3B4E23D5-A9CE-1B0C-5B31-DEAD55C7D835}"/>
+                <a16:creationId xmlns:a16="http://schemas.microsoft.com/office/drawing/2014/main" xmlns="" id="{3B4E23D5-A9CE-1B0C-5B31-DEAD55C7D835}"/>
               </a:ext>
             </a:extLst>
           </p:cNvPr>
@@ -2519,7 +2519,7 @@
           <p:cNvPr id="3" name="Espace réservé pour une image  2">
             <a:extLst>
               <a:ext uri="{FF2B5EF4-FFF2-40B4-BE49-F238E27FC236}">
-                <a16:creationId xmlns:a16="http://schemas.microsoft.com/office/drawing/2014/main" id="{3E585E92-DA5B-D7C6-74E1-DA912BE81DCB}"/>
+                <a16:creationId xmlns:a16="http://schemas.microsoft.com/office/drawing/2014/main" xmlns="" id="{3E585E92-DA5B-D7C6-74E1-DA912BE81DCB}"/>
               </a:ext>
             </a:extLst>
           </p:cNvPr>
@@ -2586,7 +2586,7 @@
           <p:cNvPr id="4" name="Espace réservé du texte 3">
             <a:extLst>
               <a:ext uri="{FF2B5EF4-FFF2-40B4-BE49-F238E27FC236}">
-                <a16:creationId xmlns:a16="http://schemas.microsoft.com/office/drawing/2014/main" id="{EDA9E2AE-EC23-97A5-5816-5A9751719A3D}"/>
+                <a16:creationId xmlns:a16="http://schemas.microsoft.com/office/drawing/2014/main" xmlns="" id="{EDA9E2AE-EC23-97A5-5816-5A9751719A3D}"/>
               </a:ext>
             </a:extLst>
           </p:cNvPr>
@@ -2657,7 +2657,7 @@
           <p:cNvPr id="5" name="Espace réservé de la date 4">
             <a:extLst>
               <a:ext uri="{FF2B5EF4-FFF2-40B4-BE49-F238E27FC236}">
-                <a16:creationId xmlns:a16="http://schemas.microsoft.com/office/drawing/2014/main" id="{1FF8E65C-9A75-B18C-2907-308D7FB7A0BE}"/>
+                <a16:creationId xmlns:a16="http://schemas.microsoft.com/office/drawing/2014/main" xmlns="" id="{1FF8E65C-9A75-B18C-2907-308D7FB7A0BE}"/>
               </a:ext>
             </a:extLst>
           </p:cNvPr>
@@ -2675,7 +2675,7 @@
           <a:p>
             <a:fld id="{C8A266F7-245B-4DBA-80AC-6E72B4EA9E8E}" type="datetimeFigureOut">
               <a:rPr lang="fr-FR" smtClean="0"/>
-              <a:t>12/05/2024</a:t>
+              <a:t>21/07/2024</a:t>
             </a:fld>
             <a:endParaRPr lang="fr-FR"/>
           </a:p>
@@ -2686,7 +2686,7 @@
           <p:cNvPr id="6" name="Espace réservé du pied de page 5">
             <a:extLst>
               <a:ext uri="{FF2B5EF4-FFF2-40B4-BE49-F238E27FC236}">
-                <a16:creationId xmlns:a16="http://schemas.microsoft.com/office/drawing/2014/main" id="{D0C4861D-A41F-16B4-6ACD-FB5D88EC3787}"/>
+                <a16:creationId xmlns:a16="http://schemas.microsoft.com/office/drawing/2014/main" xmlns="" id="{D0C4861D-A41F-16B4-6ACD-FB5D88EC3787}"/>
               </a:ext>
             </a:extLst>
           </p:cNvPr>
@@ -2711,7 +2711,7 @@
           <p:cNvPr id="7" name="Espace réservé du numéro de diapositive 6">
             <a:extLst>
               <a:ext uri="{FF2B5EF4-FFF2-40B4-BE49-F238E27FC236}">
-                <a16:creationId xmlns:a16="http://schemas.microsoft.com/office/drawing/2014/main" id="{231B0EDF-0C57-E5BB-9922-43D0360EFA63}"/>
+                <a16:creationId xmlns:a16="http://schemas.microsoft.com/office/drawing/2014/main" xmlns="" id="{231B0EDF-0C57-E5BB-9922-43D0360EFA63}"/>
               </a:ext>
             </a:extLst>
           </p:cNvPr>
@@ -2775,7 +2775,7 @@
           <p:cNvPr id="2" name="Espace réservé du titre 1">
             <a:extLst>
               <a:ext uri="{FF2B5EF4-FFF2-40B4-BE49-F238E27FC236}">
-                <a16:creationId xmlns:a16="http://schemas.microsoft.com/office/drawing/2014/main" id="{5178C960-BBFF-E875-18E7-EF78FD551B20}"/>
+                <a16:creationId xmlns:a16="http://schemas.microsoft.com/office/drawing/2014/main" xmlns="" id="{5178C960-BBFF-E875-18E7-EF78FD551B20}"/>
               </a:ext>
             </a:extLst>
           </p:cNvPr>
@@ -2813,7 +2813,7 @@
           <p:cNvPr id="3" name="Espace réservé du texte 2">
             <a:extLst>
               <a:ext uri="{FF2B5EF4-FFF2-40B4-BE49-F238E27FC236}">
-                <a16:creationId xmlns:a16="http://schemas.microsoft.com/office/drawing/2014/main" id="{ACA90BA5-6B6F-3E79-6FB2-AA51C82ED1A8}"/>
+                <a16:creationId xmlns:a16="http://schemas.microsoft.com/office/drawing/2014/main" xmlns="" id="{ACA90BA5-6B6F-3E79-6FB2-AA51C82ED1A8}"/>
               </a:ext>
             </a:extLst>
           </p:cNvPr>
@@ -2880,7 +2880,7 @@
           <p:cNvPr id="4" name="Espace réservé de la date 3">
             <a:extLst>
               <a:ext uri="{FF2B5EF4-FFF2-40B4-BE49-F238E27FC236}">
-                <a16:creationId xmlns:a16="http://schemas.microsoft.com/office/drawing/2014/main" id="{D8A1C935-6057-8F76-54E8-1114876B0761}"/>
+                <a16:creationId xmlns:a16="http://schemas.microsoft.com/office/drawing/2014/main" xmlns="" id="{D8A1C935-6057-8F76-54E8-1114876B0761}"/>
               </a:ext>
             </a:extLst>
           </p:cNvPr>
@@ -2916,7 +2916,7 @@
           <a:p>
             <a:fld id="{C8A266F7-245B-4DBA-80AC-6E72B4EA9E8E}" type="datetimeFigureOut">
               <a:rPr lang="fr-FR" smtClean="0"/>
-              <a:t>12/05/2024</a:t>
+              <a:t>21/07/2024</a:t>
             </a:fld>
             <a:endParaRPr lang="fr-FR"/>
           </a:p>
@@ -2927,7 +2927,7 @@
           <p:cNvPr id="5" name="Espace réservé du pied de page 4">
             <a:extLst>
               <a:ext uri="{FF2B5EF4-FFF2-40B4-BE49-F238E27FC236}">
-                <a16:creationId xmlns:a16="http://schemas.microsoft.com/office/drawing/2014/main" id="{BA11A790-6787-2F11-7867-56A3ADA162A8}"/>
+                <a16:creationId xmlns:a16="http://schemas.microsoft.com/office/drawing/2014/main" xmlns="" id="{BA11A790-6787-2F11-7867-56A3ADA162A8}"/>
               </a:ext>
             </a:extLst>
           </p:cNvPr>
@@ -2970,7 +2970,7 @@
           <p:cNvPr id="6" name="Espace réservé du numéro de diapositive 5">
             <a:extLst>
               <a:ext uri="{FF2B5EF4-FFF2-40B4-BE49-F238E27FC236}">
-                <a16:creationId xmlns:a16="http://schemas.microsoft.com/office/drawing/2014/main" id="{0EBA9B3D-3742-9242-10F4-71E71425F1A6}"/>
+                <a16:creationId xmlns:a16="http://schemas.microsoft.com/office/drawing/2014/main" xmlns="" id="{0EBA9B3D-3742-9242-10F4-71E71425F1A6}"/>
               </a:ext>
             </a:extLst>
           </p:cNvPr>
@@ -3338,7 +3338,7 @@
           <p:cNvPr id="2" name="Titre 1">
             <a:extLst>
               <a:ext uri="{FF2B5EF4-FFF2-40B4-BE49-F238E27FC236}">
-                <a16:creationId xmlns:a16="http://schemas.microsoft.com/office/drawing/2014/main" id="{2C421521-96CB-F3F6-7B0B-1434D69D1646}"/>
+                <a16:creationId xmlns:a16="http://schemas.microsoft.com/office/drawing/2014/main" xmlns="" id="{2C421521-96CB-F3F6-7B0B-1434D69D1646}"/>
               </a:ext>
             </a:extLst>
           </p:cNvPr>
@@ -3370,7 +3370,7 @@
           <p:cNvPr id="3" name="Sous-titre 2">
             <a:extLst>
               <a:ext uri="{FF2B5EF4-FFF2-40B4-BE49-F238E27FC236}">
-                <a16:creationId xmlns:a16="http://schemas.microsoft.com/office/drawing/2014/main" id="{811EEACB-7F7F-DD42-76DE-5B5A0568E674}"/>
+                <a16:creationId xmlns:a16="http://schemas.microsoft.com/office/drawing/2014/main" xmlns="" id="{811EEACB-7F7F-DD42-76DE-5B5A0568E674}"/>
               </a:ext>
             </a:extLst>
           </p:cNvPr>
@@ -3425,7 +3425,7 @@
           <p:cNvPr id="5" name="ZoneTexte 4">
             <a:extLst>
               <a:ext uri="{FF2B5EF4-FFF2-40B4-BE49-F238E27FC236}">
-                <a16:creationId xmlns:a16="http://schemas.microsoft.com/office/drawing/2014/main" id="{98879C0D-D92C-B34F-06B2-1244ECAF7FDE}"/>
+                <a16:creationId xmlns:a16="http://schemas.microsoft.com/office/drawing/2014/main" xmlns="" id="{98879C0D-D92C-B34F-06B2-1244ECAF7FDE}"/>
               </a:ext>
             </a:extLst>
           </p:cNvPr>
@@ -3619,7 +3619,7 @@
           <p:cNvPr id="3" name="ZoneTexte 2">
             <a:extLst>
               <a:ext uri="{FF2B5EF4-FFF2-40B4-BE49-F238E27FC236}">
-                <a16:creationId xmlns:a16="http://schemas.microsoft.com/office/drawing/2014/main" id="{21453B37-A35C-D735-38A3-1C02F891EAF3}"/>
+                <a16:creationId xmlns:a16="http://schemas.microsoft.com/office/drawing/2014/main" xmlns="" id="{21453B37-A35C-D735-38A3-1C02F891EAF3}"/>
               </a:ext>
             </a:extLst>
           </p:cNvPr>
@@ -3629,7 +3629,7 @@
         <p:spPr>
           <a:xfrm>
             <a:off x="0" y="0"/>
-            <a:ext cx="12192000" cy="6001643"/>
+            <a:ext cx="12192000" cy="6863417"/>
           </a:xfrm>
           <a:prstGeom prst="rect">
             <a:avLst/>
@@ -3644,7 +3644,7 @@
           <a:p>
             <a:pPr algn="ctr"/>
             <a:r>
-              <a:rPr lang="fr-FR" sz="9600" b="1" dirty="0">
+              <a:rPr lang="fr-FR" sz="8800" b="1" dirty="0">
                 <a:effectLst>
                   <a:outerShdw blurRad="38100" dist="38100" dir="2700000" algn="tl">
                     <a:srgbClr val="000000">
@@ -3656,7 +3656,7 @@
               <a:t>F</a:t>
             </a:r>
             <a:r>
-              <a:rPr lang="fr-FR" sz="9600" b="1" i="0" dirty="0">
+              <a:rPr lang="fr-FR" sz="8800" b="1" i="0" dirty="0">
                 <a:effectLst>
                   <a:outerShdw blurRad="38100" dist="38100" dir="2700000" algn="tl">
                     <a:srgbClr val="000000">
@@ -3668,7 +3668,7 @@
               <a:t>a </a:t>
             </a:r>
             <a:r>
-              <a:rPr lang="fr-FR" sz="9600" b="1" i="0" dirty="0" err="1">
+              <a:rPr lang="fr-FR" sz="8800" b="1" i="0" dirty="0" err="1">
                 <a:effectLst>
                   <a:outerShdw blurRad="38100" dist="38100" dir="2700000" algn="tl">
                     <a:srgbClr val="000000">
@@ -3680,7 +3680,7 @@
               <a:t>be</a:t>
             </a:r>
             <a:r>
-              <a:rPr lang="fr-FR" sz="9600" b="1" i="0" dirty="0">
+              <a:rPr lang="fr-FR" sz="8800" b="1" i="0" dirty="0">
                 <a:effectLst>
                   <a:outerShdw blurRad="38100" dist="38100" dir="2700000" algn="tl">
                     <a:srgbClr val="000000">
@@ -3692,7 +3692,7 @@
               <a:t> </a:t>
             </a:r>
             <a:r>
-              <a:rPr lang="fr-FR" sz="9600" b="1" i="0" dirty="0" err="1">
+              <a:rPr lang="fr-FR" sz="8800" b="1" i="0" dirty="0" err="1">
                 <a:effectLst>
                   <a:outerShdw blurRad="38100" dist="38100" dir="2700000" algn="tl">
                     <a:srgbClr val="000000">
@@ -3704,7 +3704,7 @@
               <a:t>fitia</a:t>
             </a:r>
             <a:r>
-              <a:rPr lang="fr-FR" sz="9600" b="1" i="0" dirty="0">
+              <a:rPr lang="fr-FR" sz="8800" b="1" i="0" dirty="0">
                 <a:effectLst>
                   <a:outerShdw blurRad="38100" dist="38100" dir="2700000" algn="tl">
                     <a:srgbClr val="000000">
@@ -3716,7 +3716,7 @@
               <a:t> </a:t>
             </a:r>
             <a:r>
-              <a:rPr lang="fr-FR" sz="9600" b="1" i="0" dirty="0" err="1">
+              <a:rPr lang="fr-FR" sz="8800" b="1" i="0" dirty="0" err="1">
                 <a:effectLst>
                   <a:outerShdw blurRad="38100" dist="38100" dir="2700000" algn="tl">
                     <a:srgbClr val="000000">
@@ -3728,7 +3728,7 @@
               <a:t>ny</a:t>
             </a:r>
             <a:r>
-              <a:rPr lang="fr-FR" sz="9600" b="1" i="0" dirty="0">
+              <a:rPr lang="fr-FR" sz="8800" b="1" i="0" dirty="0">
                 <a:effectLst>
                   <a:outerShdw blurRad="38100" dist="38100" dir="2700000" algn="tl">
                     <a:srgbClr val="000000">
@@ -3740,7 +3740,7 @@
               <a:t> </a:t>
             </a:r>
             <a:r>
-              <a:rPr lang="fr-FR" sz="9600" b="1" i="0" dirty="0" err="1">
+              <a:rPr lang="fr-FR" sz="8800" b="1" i="0" dirty="0" err="1">
                 <a:effectLst>
                   <a:outerShdw blurRad="38100" dist="38100" dir="2700000" algn="tl">
                     <a:srgbClr val="000000">
@@ -3752,7 +3752,7 @@
               <a:t>Tomponay</a:t>
             </a:r>
             <a:r>
-              <a:rPr lang="fr-FR" sz="9600" b="1" i="0" dirty="0">
+              <a:rPr lang="fr-FR" sz="8800" b="1" i="0" dirty="0">
                 <a:effectLst>
                   <a:outerShdw blurRad="38100" dist="38100" dir="2700000" algn="tl">
                     <a:srgbClr val="000000">
@@ -3764,7 +3764,7 @@
               <a:t>, </a:t>
             </a:r>
             <a:r>
-              <a:rPr lang="fr-FR" sz="9600" b="1" i="0" dirty="0" err="1">
+              <a:rPr lang="fr-FR" sz="8800" b="1" i="0" dirty="0" err="1">
                 <a:effectLst>
                   <a:outerShdw blurRad="38100" dist="38100" dir="2700000" algn="tl">
                     <a:srgbClr val="000000">
@@ -3776,7 +3776,7 @@
               <a:t>ny</a:t>
             </a:r>
             <a:r>
-              <a:rPr lang="fr-FR" sz="9600" b="1" i="0" dirty="0">
+              <a:rPr lang="fr-FR" sz="8800" b="1" i="0" dirty="0">
                 <a:effectLst>
                   <a:outerShdw blurRad="38100" dist="38100" dir="2700000" algn="tl">
                     <a:srgbClr val="000000">
@@ -3788,7 +3788,7 @@
               <a:t> </a:t>
             </a:r>
             <a:r>
-              <a:rPr lang="fr-FR" sz="9600" b="1" i="0" dirty="0" err="1">
+              <a:rPr lang="fr-FR" sz="8800" b="1" i="0" dirty="0" err="1">
                 <a:effectLst>
                   <a:outerShdw blurRad="38100" dist="38100" dir="2700000" algn="tl">
                     <a:srgbClr val="000000">
@@ -3800,7 +3800,7 @@
               <a:t>Tompo</a:t>
             </a:r>
             <a:r>
-              <a:rPr lang="fr-FR" sz="9600" b="1" i="0" dirty="0">
+              <a:rPr lang="fr-FR" sz="8800" b="1" i="0" dirty="0">
                 <a:effectLst>
                   <a:outerShdw blurRad="38100" dist="38100" dir="2700000" algn="tl">
                     <a:srgbClr val="000000">
@@ -3812,7 +3812,7 @@
               <a:t> </a:t>
             </a:r>
             <a:r>
-              <a:rPr lang="fr-FR" sz="9600" b="1" i="0" dirty="0" err="1">
+              <a:rPr lang="fr-FR" sz="8800" b="1" i="0" dirty="0" err="1">
                 <a:effectLst>
                   <a:outerShdw blurRad="38100" dist="38100" dir="2700000" algn="tl">
                     <a:srgbClr val="000000">
@@ -3824,7 +3824,7 @@
               <a:t>tia</a:t>
             </a:r>
             <a:r>
-              <a:rPr lang="fr-FR" sz="9600" b="1" i="0" dirty="0">
+              <a:rPr lang="fr-FR" sz="8800" b="1" i="0" dirty="0">
                 <a:effectLst>
                   <a:outerShdw blurRad="38100" dist="38100" dir="2700000" algn="tl">
                     <a:srgbClr val="000000">
@@ -3836,7 +3836,7 @@
               <a:t> </a:t>
             </a:r>
             <a:r>
-              <a:rPr lang="fr-FR" sz="9600" b="1" i="0" dirty="0" err="1">
+              <a:rPr lang="fr-FR" sz="8800" b="1" i="0" dirty="0" err="1">
                 <a:effectLst>
                   <a:outerShdw blurRad="38100" dist="38100" dir="2700000" algn="tl">
                     <a:srgbClr val="000000">
@@ -3848,7 +3848,7 @@
               <a:t>anay</a:t>
             </a:r>
             <a:r>
-              <a:rPr lang="fr-FR" sz="9600" b="1" i="0" dirty="0">
+              <a:rPr lang="fr-FR" sz="8800" b="1" i="0" dirty="0">
                 <a:effectLst>
                   <a:outerShdw blurRad="38100" dist="38100" dir="2700000" algn="tl">
                     <a:srgbClr val="000000">
@@ -3860,7 +3860,7 @@
               <a:t>, </a:t>
             </a:r>
             <a:r>
-              <a:rPr lang="fr-FR" sz="9600" b="1" i="0" dirty="0" err="1">
+              <a:rPr lang="fr-FR" sz="8800" b="1" i="0" dirty="0" err="1">
                 <a:effectLst>
                   <a:outerShdw blurRad="38100" dist="38100" dir="2700000" algn="tl">
                     <a:srgbClr val="000000">
@@ -3872,7 +3872,7 @@
               <a:t>Mpanjaka</a:t>
             </a:r>
             <a:r>
-              <a:rPr lang="fr-FR" sz="9600" b="1" i="0" dirty="0">
+              <a:rPr lang="fr-FR" sz="8800" b="1" i="0" dirty="0">
                 <a:effectLst>
                   <a:outerShdw blurRad="38100" dist="38100" dir="2700000" algn="tl">
                     <a:srgbClr val="000000">
@@ -3884,7 +3884,7 @@
               <a:t> </a:t>
             </a:r>
             <a:r>
-              <a:rPr lang="fr-FR" sz="9600" b="1" i="0" dirty="0" err="1">
+              <a:rPr lang="fr-FR" sz="8800" b="1" i="0" dirty="0" err="1">
                 <a:effectLst>
                   <a:outerShdw blurRad="38100" dist="38100" dir="2700000" algn="tl">
                     <a:srgbClr val="000000">
@@ -3896,7 +3896,7 @@
               <a:t>tia</a:t>
             </a:r>
             <a:r>
-              <a:rPr lang="fr-FR" sz="9600" b="1" i="0" dirty="0">
+              <a:rPr lang="fr-FR" sz="8800" b="1" i="0" dirty="0">
                 <a:effectLst>
                   <a:outerShdw blurRad="38100" dist="38100" dir="2700000" algn="tl">
                     <a:srgbClr val="000000">
@@ -3908,7 +3908,7 @@
               <a:t>, </a:t>
             </a:r>
             <a:r>
-              <a:rPr lang="fr-FR" sz="9600" b="1" i="0" dirty="0" err="1">
+              <a:rPr lang="fr-FR" sz="8800" b="1" i="0" dirty="0" err="1">
                 <a:effectLst>
                   <a:outerShdw blurRad="38100" dist="38100" dir="2700000" algn="tl">
                     <a:srgbClr val="000000">
@@ -3920,7 +3920,7 @@
               <a:t>Mpamindra</a:t>
             </a:r>
             <a:r>
-              <a:rPr lang="fr-FR" sz="9600" b="1" i="0" dirty="0">
+              <a:rPr lang="fr-FR" sz="8800" b="1" i="0" dirty="0">
                 <a:effectLst>
                   <a:outerShdw blurRad="38100" dist="38100" dir="2700000" algn="tl">
                     <a:srgbClr val="000000">
@@ -3932,7 +3932,7 @@
               <a:t> </a:t>
             </a:r>
             <a:r>
-              <a:rPr lang="fr-FR" sz="9600" b="1" i="0" dirty="0" err="1">
+              <a:rPr lang="fr-FR" sz="8800" b="1" i="0" dirty="0" err="1">
                 <a:effectLst>
                   <a:outerShdw blurRad="38100" dist="38100" dir="2700000" algn="tl">
                     <a:srgbClr val="000000">
@@ -3944,7 +3944,7 @@
               <a:t>fo</a:t>
             </a:r>
             <a:r>
-              <a:rPr lang="fr-FR" sz="9600" b="1" i="0" dirty="0">
+              <a:rPr lang="fr-FR" sz="8800" b="1" i="0" dirty="0">
                 <a:effectLst>
                   <a:outerShdw blurRad="38100" dist="38100" dir="2700000" algn="tl">
                     <a:srgbClr val="000000">
@@ -3955,6 +3955,75 @@
               </a:rPr>
               <a:t>. </a:t>
             </a:r>
+            <a:endParaRPr lang="fr-FR" sz="8800" b="1" i="0" dirty="0" smtClean="0">
+              <a:effectLst>
+                <a:outerShdw blurRad="38100" dist="38100" dir="2700000" algn="tl">
+                  <a:srgbClr val="000000">
+                    <a:alpha val="43137"/>
+                  </a:srgbClr>
+                </a:outerShdw>
+              </a:effectLst>
+            </a:endParaRPr>
+          </a:p>
+          <a:p>
+            <a:pPr algn="ctr"/>
+            <a:r>
+              <a:rPr lang="fr-FR" sz="8800" b="1" dirty="0" err="1">
+                <a:effectLst>
+                  <a:outerShdw blurRad="38100" dist="38100" dir="2700000" algn="tl">
+                    <a:srgbClr val="000000">
+                      <a:alpha val="43137"/>
+                    </a:srgbClr>
+                  </a:outerShdw>
+                </a:effectLst>
+              </a:rPr>
+              <a:t>Deraina</a:t>
+            </a:r>
+            <a:r>
+              <a:rPr lang="fr-FR" sz="8800" b="1" dirty="0">
+                <a:effectLst>
+                  <a:outerShdw blurRad="38100" dist="38100" dir="2700000" algn="tl">
+                    <a:srgbClr val="000000">
+                      <a:alpha val="43137"/>
+                    </a:srgbClr>
+                  </a:outerShdw>
+                </a:effectLst>
+              </a:rPr>
+              <a:t> </a:t>
+            </a:r>
+            <a:r>
+              <a:rPr lang="fr-FR" sz="8800" b="1" dirty="0" err="1">
+                <a:effectLst>
+                  <a:outerShdw blurRad="38100" dist="38100" dir="2700000" algn="tl">
+                    <a:srgbClr val="000000">
+                      <a:alpha val="43137"/>
+                    </a:srgbClr>
+                  </a:outerShdw>
+                </a:effectLst>
+              </a:rPr>
+              <a:t>Hianao</a:t>
+            </a:r>
+            <a:r>
+              <a:rPr lang="fr-FR" sz="8800" b="1" dirty="0">
+                <a:effectLst>
+                  <a:outerShdw blurRad="38100" dist="38100" dir="2700000" algn="tl">
+                    <a:srgbClr val="000000">
+                      <a:alpha val="43137"/>
+                    </a:srgbClr>
+                  </a:outerShdw>
+                </a:effectLst>
+              </a:rPr>
+              <a:t>.</a:t>
+            </a:r>
+            <a:endParaRPr lang="fr-FR" sz="8800" b="1" i="0" dirty="0">
+              <a:effectLst>
+                <a:outerShdw blurRad="38100" dist="38100" dir="2700000" algn="tl">
+                  <a:srgbClr val="000000">
+                    <a:alpha val="43137"/>
+                  </a:srgbClr>
+                </a:outerShdw>
+              </a:effectLst>
+            </a:endParaRPr>
           </a:p>
         </p:txBody>
       </p:sp>
@@ -3993,7 +4062,7 @@
           <p:cNvPr id="3" name="ZoneTexte 2">
             <a:extLst>
               <a:ext uri="{FF2B5EF4-FFF2-40B4-BE49-F238E27FC236}">
-                <a16:creationId xmlns:a16="http://schemas.microsoft.com/office/drawing/2014/main" id="{D3FEACE4-19BB-8C86-7608-BED68E481C56}"/>
+                <a16:creationId xmlns:a16="http://schemas.microsoft.com/office/drawing/2014/main" xmlns="" id="{D3FEACE4-19BB-8C86-7608-BED68E481C56}"/>
               </a:ext>
             </a:extLst>
           </p:cNvPr>
@@ -4002,8 +4071,8 @@
         </p:nvSpPr>
         <p:spPr>
           <a:xfrm>
-            <a:off x="0" y="0"/>
-            <a:ext cx="12192000" cy="6001643"/>
+            <a:off x="518621" y="0"/>
+            <a:ext cx="11013743" cy="6863417"/>
           </a:xfrm>
           <a:prstGeom prst="rect">
             <a:avLst/>
@@ -4018,19 +4087,19 @@
           <a:p>
             <a:pPr algn="ctr"/>
             <a:r>
-              <a:rPr lang="fr-FR" sz="9600" b="1" i="0" dirty="0" err="1">
-                <a:effectLst>
-                  <a:outerShdw blurRad="38100" dist="38100" dir="2700000" algn="tl">
-                    <a:srgbClr val="000000">
-                      <a:alpha val="43137"/>
-                    </a:srgbClr>
-                  </a:outerShdw>
-                </a:effectLst>
-              </a:rPr>
-              <a:t>Deraina</a:t>
-            </a:r>
-            <a:r>
-              <a:rPr lang="fr-FR" sz="9600" b="1" i="0" dirty="0">
+              <a:rPr lang="fr-FR" sz="8800" b="1" i="0" dirty="0" err="1" smtClean="0">
+                <a:effectLst>
+                  <a:outerShdw blurRad="38100" dist="38100" dir="2700000" algn="tl">
+                    <a:srgbClr val="000000">
+                      <a:alpha val="43137"/>
+                    </a:srgbClr>
+                  </a:outerShdw>
+                </a:effectLst>
+              </a:rPr>
+              <a:t>Isaoranay</a:t>
+            </a:r>
+            <a:r>
+              <a:rPr lang="fr-FR" sz="8800" b="1" i="0" dirty="0" smtClean="0">
                 <a:effectLst>
                   <a:outerShdw blurRad="38100" dist="38100" dir="2700000" algn="tl">
                     <a:srgbClr val="000000">
@@ -4042,7 +4111,79 @@
               <a:t> </a:t>
             </a:r>
             <a:r>
-              <a:rPr lang="fr-FR" sz="9600" b="1" i="0" dirty="0" err="1">
+              <a:rPr lang="fr-FR" sz="8800" b="1" i="0" dirty="0" err="1">
+                <a:effectLst>
+                  <a:outerShdw blurRad="38100" dist="38100" dir="2700000" algn="tl">
+                    <a:srgbClr val="000000">
+                      <a:alpha val="43137"/>
+                    </a:srgbClr>
+                  </a:outerShdw>
+                </a:effectLst>
+              </a:rPr>
+              <a:t>izao</a:t>
+            </a:r>
+            <a:r>
+              <a:rPr lang="fr-FR" sz="8800" b="1" i="0" dirty="0">
+                <a:effectLst>
+                  <a:outerShdw blurRad="38100" dist="38100" dir="2700000" algn="tl">
+                    <a:srgbClr val="000000">
+                      <a:alpha val="43137"/>
+                    </a:srgbClr>
+                  </a:outerShdw>
+                </a:effectLst>
+              </a:rPr>
+              <a:t>, fa </a:t>
+            </a:r>
+            <a:r>
+              <a:rPr lang="fr-FR" sz="8800" b="1" i="0" dirty="0" err="1">
+                <a:effectLst>
+                  <a:outerShdw blurRad="38100" dist="38100" dir="2700000" algn="tl">
+                    <a:srgbClr val="000000">
+                      <a:alpha val="43137"/>
+                    </a:srgbClr>
+                  </a:outerShdw>
+                </a:effectLst>
+              </a:rPr>
+              <a:t>be</a:t>
+            </a:r>
+            <a:r>
+              <a:rPr lang="fr-FR" sz="8800" b="1" i="0" dirty="0">
+                <a:effectLst>
+                  <a:outerShdw blurRad="38100" dist="38100" dir="2700000" algn="tl">
+                    <a:srgbClr val="000000">
+                      <a:alpha val="43137"/>
+                    </a:srgbClr>
+                  </a:outerShdw>
+                </a:effectLst>
+              </a:rPr>
+              <a:t> </a:t>
+            </a:r>
+            <a:r>
+              <a:rPr lang="fr-FR" sz="8800" b="1" i="0" dirty="0" err="1">
+                <a:effectLst>
+                  <a:outerShdw blurRad="38100" dist="38100" dir="2700000" algn="tl">
+                    <a:srgbClr val="000000">
+                      <a:alpha val="43137"/>
+                    </a:srgbClr>
+                  </a:outerShdw>
+                </a:effectLst>
+              </a:rPr>
+              <a:t>fiantra</a:t>
+            </a:r>
+            <a:r>
+              <a:rPr lang="fr-FR" sz="8800" b="1" i="0" dirty="0">
+                <a:effectLst>
+                  <a:outerShdw blurRad="38100" dist="38100" dir="2700000" algn="tl">
+                    <a:srgbClr val="000000">
+                      <a:alpha val="43137"/>
+                    </a:srgbClr>
+                  </a:outerShdw>
+                </a:effectLst>
+              </a:rPr>
+              <a:t> </a:t>
+            </a:r>
+            <a:r>
+              <a:rPr lang="fr-FR" sz="8800" b="1" i="0" dirty="0" err="1">
                 <a:effectLst>
                   <a:outerShdw blurRad="38100" dist="38100" dir="2700000" algn="tl">
                     <a:srgbClr val="000000">
@@ -4054,7 +4195,154 @@
               <a:t>Hianao</a:t>
             </a:r>
             <a:r>
-              <a:rPr lang="fr-FR" sz="9600" b="1" i="0" dirty="0">
+              <a:rPr lang="fr-FR" sz="8800" b="1" i="0" dirty="0">
+                <a:effectLst>
+                  <a:outerShdw blurRad="38100" dist="38100" dir="2700000" algn="tl">
+                    <a:srgbClr val="000000">
+                      <a:alpha val="43137"/>
+                    </a:srgbClr>
+                  </a:outerShdw>
+                </a:effectLst>
+              </a:rPr>
+              <a:t>, </a:t>
+            </a:r>
+            <a:r>
+              <a:rPr lang="fr-FR" sz="8800" b="1" i="0" dirty="0" err="1">
+                <a:effectLst>
+                  <a:outerShdw blurRad="38100" dist="38100" dir="2700000" algn="tl">
+                    <a:srgbClr val="000000">
+                      <a:alpha val="43137"/>
+                    </a:srgbClr>
+                  </a:outerShdw>
+                </a:effectLst>
+              </a:rPr>
+              <a:t>Mpanjaka</a:t>
+            </a:r>
+            <a:r>
+              <a:rPr lang="fr-FR" sz="8800" b="1" i="0" dirty="0">
+                <a:effectLst>
+                  <a:outerShdw blurRad="38100" dist="38100" dir="2700000" algn="tl">
+                    <a:srgbClr val="000000">
+                      <a:alpha val="43137"/>
+                    </a:srgbClr>
+                  </a:outerShdw>
+                </a:effectLst>
+              </a:rPr>
+              <a:t> </a:t>
+            </a:r>
+            <a:r>
+              <a:rPr lang="fr-FR" sz="8800" b="1" i="0" dirty="0" err="1">
+                <a:effectLst>
+                  <a:outerShdw blurRad="38100" dist="38100" dir="2700000" algn="tl">
+                    <a:srgbClr val="000000">
+                      <a:alpha val="43137"/>
+                    </a:srgbClr>
+                  </a:outerShdw>
+                </a:effectLst>
+              </a:rPr>
+              <a:t>be</a:t>
+            </a:r>
+            <a:r>
+              <a:rPr lang="fr-FR" sz="8800" b="1" i="0" dirty="0">
+                <a:effectLst>
+                  <a:outerShdw blurRad="38100" dist="38100" dir="2700000" algn="tl">
+                    <a:srgbClr val="000000">
+                      <a:alpha val="43137"/>
+                    </a:srgbClr>
+                  </a:outerShdw>
+                </a:effectLst>
+              </a:rPr>
+              <a:t> </a:t>
+            </a:r>
+            <a:r>
+              <a:rPr lang="fr-FR" sz="8800" b="1" i="0" dirty="0" err="1">
+                <a:effectLst>
+                  <a:outerShdw blurRad="38100" dist="38100" dir="2700000" algn="tl">
+                    <a:srgbClr val="000000">
+                      <a:alpha val="43137"/>
+                    </a:srgbClr>
+                  </a:outerShdw>
+                </a:effectLst>
+              </a:rPr>
+              <a:t>fitia</a:t>
+            </a:r>
+            <a:r>
+              <a:rPr lang="fr-FR" sz="8800" b="1" i="0" dirty="0" smtClean="0">
+                <a:effectLst>
+                  <a:outerShdw blurRad="38100" dist="38100" dir="2700000" algn="tl">
+                    <a:srgbClr val="000000">
+                      <a:alpha val="43137"/>
+                    </a:srgbClr>
+                  </a:outerShdw>
+                </a:effectLst>
+              </a:rPr>
+              <a:t>.</a:t>
+            </a:r>
+          </a:p>
+          <a:p>
+            <a:pPr algn="ctr"/>
+            <a:r>
+              <a:rPr lang="fr-FR" sz="8800" b="1" dirty="0" err="1">
+                <a:effectLst>
+                  <a:outerShdw blurRad="38100" dist="38100" dir="2700000" algn="tl">
+                    <a:srgbClr val="000000">
+                      <a:alpha val="43137"/>
+                    </a:srgbClr>
+                  </a:outerShdw>
+                </a:effectLst>
+              </a:rPr>
+              <a:t>Isaoranay</a:t>
+            </a:r>
+            <a:r>
+              <a:rPr lang="fr-FR" sz="8800" b="1" dirty="0">
+                <a:effectLst>
+                  <a:outerShdw blurRad="38100" dist="38100" dir="2700000" algn="tl">
+                    <a:srgbClr val="000000">
+                      <a:alpha val="43137"/>
+                    </a:srgbClr>
+                  </a:outerShdw>
+                </a:effectLst>
+              </a:rPr>
+              <a:t> </a:t>
+            </a:r>
+            <a:r>
+              <a:rPr lang="fr-FR" sz="8800" b="1" dirty="0" err="1">
+                <a:effectLst>
+                  <a:outerShdw blurRad="38100" dist="38100" dir="2700000" algn="tl">
+                    <a:srgbClr val="000000">
+                      <a:alpha val="43137"/>
+                    </a:srgbClr>
+                  </a:outerShdw>
+                </a:effectLst>
+              </a:rPr>
+              <a:t>ny</a:t>
+            </a:r>
+            <a:r>
+              <a:rPr lang="fr-FR" sz="8800" b="1" dirty="0">
+                <a:effectLst>
+                  <a:outerShdw blurRad="38100" dist="38100" dir="2700000" algn="tl">
+                    <a:srgbClr val="000000">
+                      <a:alpha val="43137"/>
+                    </a:srgbClr>
+                  </a:outerShdw>
+                </a:effectLst>
+              </a:rPr>
+              <a:t> </a:t>
+            </a:r>
+            <a:r>
+              <a:rPr lang="fr-FR" sz="8800" b="1" dirty="0" err="1">
+                <a:effectLst>
+                  <a:outerShdw blurRad="38100" dist="38100" dir="2700000" algn="tl">
+                    <a:srgbClr val="000000">
+                      <a:alpha val="43137"/>
+                    </a:srgbClr>
+                  </a:outerShdw>
+                </a:effectLst>
+              </a:rPr>
+              <a:t>Tomponay</a:t>
+            </a:r>
+            <a:r>
+              <a:rPr lang="fr-FR" sz="8800" b="1" dirty="0">
                 <a:effectLst>
                   <a:outerShdw blurRad="38100" dist="38100" dir="2700000" algn="tl">
                     <a:srgbClr val="000000">
@@ -4065,199 +4353,7 @@
               </a:rPr>
               <a:t>. </a:t>
             </a:r>
-            <a:r>
-              <a:rPr lang="fr-FR" sz="9600" b="1" i="0" dirty="0" err="1">
-                <a:effectLst>
-                  <a:outerShdw blurRad="38100" dist="38100" dir="2700000" algn="tl">
-                    <a:srgbClr val="000000">
-                      <a:alpha val="43137"/>
-                    </a:srgbClr>
-                  </a:outerShdw>
-                </a:effectLst>
-              </a:rPr>
-              <a:t>Isaoranay</a:t>
-            </a:r>
-            <a:r>
-              <a:rPr lang="fr-FR" sz="9600" b="1" i="0" dirty="0">
-                <a:effectLst>
-                  <a:outerShdw blurRad="38100" dist="38100" dir="2700000" algn="tl">
-                    <a:srgbClr val="000000">
-                      <a:alpha val="43137"/>
-                    </a:srgbClr>
-                  </a:outerShdw>
-                </a:effectLst>
-              </a:rPr>
-              <a:t> </a:t>
-            </a:r>
-            <a:r>
-              <a:rPr lang="fr-FR" sz="9600" b="1" i="0" dirty="0" err="1">
-                <a:effectLst>
-                  <a:outerShdw blurRad="38100" dist="38100" dir="2700000" algn="tl">
-                    <a:srgbClr val="000000">
-                      <a:alpha val="43137"/>
-                    </a:srgbClr>
-                  </a:outerShdw>
-                </a:effectLst>
-              </a:rPr>
-              <a:t>izao</a:t>
-            </a:r>
-            <a:r>
-              <a:rPr lang="fr-FR" sz="9600" b="1" i="0" dirty="0">
-                <a:effectLst>
-                  <a:outerShdw blurRad="38100" dist="38100" dir="2700000" algn="tl">
-                    <a:srgbClr val="000000">
-                      <a:alpha val="43137"/>
-                    </a:srgbClr>
-                  </a:outerShdw>
-                </a:effectLst>
-              </a:rPr>
-              <a:t>, fa </a:t>
-            </a:r>
-            <a:r>
-              <a:rPr lang="fr-FR" sz="9600" b="1" i="0" dirty="0" err="1">
-                <a:effectLst>
-                  <a:outerShdw blurRad="38100" dist="38100" dir="2700000" algn="tl">
-                    <a:srgbClr val="000000">
-                      <a:alpha val="43137"/>
-                    </a:srgbClr>
-                  </a:outerShdw>
-                </a:effectLst>
-              </a:rPr>
-              <a:t>be</a:t>
-            </a:r>
-            <a:r>
-              <a:rPr lang="fr-FR" sz="9600" b="1" i="0" dirty="0">
-                <a:effectLst>
-                  <a:outerShdw blurRad="38100" dist="38100" dir="2700000" algn="tl">
-                    <a:srgbClr val="000000">
-                      <a:alpha val="43137"/>
-                    </a:srgbClr>
-                  </a:outerShdw>
-                </a:effectLst>
-              </a:rPr>
-              <a:t> </a:t>
-            </a:r>
-            <a:r>
-              <a:rPr lang="fr-FR" sz="9600" b="1" i="0" dirty="0" err="1">
-                <a:effectLst>
-                  <a:outerShdw blurRad="38100" dist="38100" dir="2700000" algn="tl">
-                    <a:srgbClr val="000000">
-                      <a:alpha val="43137"/>
-                    </a:srgbClr>
-                  </a:outerShdw>
-                </a:effectLst>
-              </a:rPr>
-              <a:t>fiantra</a:t>
-            </a:r>
-            <a:r>
-              <a:rPr lang="fr-FR" sz="9600" b="1" i="0" dirty="0">
-                <a:effectLst>
-                  <a:outerShdw blurRad="38100" dist="38100" dir="2700000" algn="tl">
-                    <a:srgbClr val="000000">
-                      <a:alpha val="43137"/>
-                    </a:srgbClr>
-                  </a:outerShdw>
-                </a:effectLst>
-              </a:rPr>
-              <a:t> </a:t>
-            </a:r>
-            <a:r>
-              <a:rPr lang="fr-FR" sz="9600" b="1" i="0" dirty="0" err="1">
-                <a:effectLst>
-                  <a:outerShdw blurRad="38100" dist="38100" dir="2700000" algn="tl">
-                    <a:srgbClr val="000000">
-                      <a:alpha val="43137"/>
-                    </a:srgbClr>
-                  </a:outerShdw>
-                </a:effectLst>
-              </a:rPr>
-              <a:t>Hianao</a:t>
-            </a:r>
-            <a:r>
-              <a:rPr lang="fr-FR" sz="9600" b="1" i="0" dirty="0">
-                <a:effectLst>
-                  <a:outerShdw blurRad="38100" dist="38100" dir="2700000" algn="tl">
-                    <a:srgbClr val="000000">
-                      <a:alpha val="43137"/>
-                    </a:srgbClr>
-                  </a:outerShdw>
-                </a:effectLst>
-              </a:rPr>
-              <a:t>, </a:t>
-            </a:r>
-            <a:r>
-              <a:rPr lang="fr-FR" sz="9600" b="1" i="0" dirty="0" err="1">
-                <a:effectLst>
-                  <a:outerShdw blurRad="38100" dist="38100" dir="2700000" algn="tl">
-                    <a:srgbClr val="000000">
-                      <a:alpha val="43137"/>
-                    </a:srgbClr>
-                  </a:outerShdw>
-                </a:effectLst>
-              </a:rPr>
-              <a:t>Mpanjaka</a:t>
-            </a:r>
-            <a:r>
-              <a:rPr lang="fr-FR" sz="9600" b="1" i="0" dirty="0">
-                <a:effectLst>
-                  <a:outerShdw blurRad="38100" dist="38100" dir="2700000" algn="tl">
-                    <a:srgbClr val="000000">
-                      <a:alpha val="43137"/>
-                    </a:srgbClr>
-                  </a:outerShdw>
-                </a:effectLst>
-              </a:rPr>
-              <a:t> </a:t>
-            </a:r>
-            <a:r>
-              <a:rPr lang="fr-FR" sz="9600" b="1" i="0" dirty="0" err="1">
-                <a:effectLst>
-                  <a:outerShdw blurRad="38100" dist="38100" dir="2700000" algn="tl">
-                    <a:srgbClr val="000000">
-                      <a:alpha val="43137"/>
-                    </a:srgbClr>
-                  </a:outerShdw>
-                </a:effectLst>
-              </a:rPr>
-              <a:t>be</a:t>
-            </a:r>
-            <a:r>
-              <a:rPr lang="fr-FR" sz="9600" b="1" i="0" dirty="0">
-                <a:effectLst>
-                  <a:outerShdw blurRad="38100" dist="38100" dir="2700000" algn="tl">
-                    <a:srgbClr val="000000">
-                      <a:alpha val="43137"/>
-                    </a:srgbClr>
-                  </a:outerShdw>
-                </a:effectLst>
-              </a:rPr>
-              <a:t> </a:t>
-            </a:r>
-            <a:r>
-              <a:rPr lang="fr-FR" sz="9600" b="1" i="0" dirty="0" err="1">
-                <a:effectLst>
-                  <a:outerShdw blurRad="38100" dist="38100" dir="2700000" algn="tl">
-                    <a:srgbClr val="000000">
-                      <a:alpha val="43137"/>
-                    </a:srgbClr>
-                  </a:outerShdw>
-                </a:effectLst>
-              </a:rPr>
-              <a:t>fitia</a:t>
-            </a:r>
-            <a:r>
-              <a:rPr lang="fr-FR" sz="9600" b="1" i="0" dirty="0">
-                <a:effectLst>
-                  <a:outerShdw blurRad="38100" dist="38100" dir="2700000" algn="tl">
-                    <a:srgbClr val="000000">
-                      <a:alpha val="43137"/>
-                    </a:srgbClr>
-                  </a:outerShdw>
-                </a:effectLst>
-              </a:rPr>
-              <a:t>. </a:t>
-            </a:r>
-            <a:endParaRPr lang="fr-FR" sz="9600" dirty="0"/>
+            <a:endParaRPr lang="fr-FR" sz="8800" dirty="0"/>
           </a:p>
         </p:txBody>
       </p:sp>
@@ -4296,7 +4392,7 @@
           <p:cNvPr id="3" name="ZoneTexte 2">
             <a:extLst>
               <a:ext uri="{FF2B5EF4-FFF2-40B4-BE49-F238E27FC236}">
-                <a16:creationId xmlns:a16="http://schemas.microsoft.com/office/drawing/2014/main" id="{5FEBA20D-7BA4-E1FC-C646-D77C3C2C016F}"/>
+                <a16:creationId xmlns:a16="http://schemas.microsoft.com/office/drawing/2014/main" xmlns="" id="{5FEBA20D-7BA4-E1FC-C646-D77C3C2C016F}"/>
               </a:ext>
             </a:extLst>
           </p:cNvPr>
@@ -4305,8 +4401,8 @@
         </p:nvSpPr>
         <p:spPr>
           <a:xfrm>
-            <a:off x="-2344" y="0"/>
-            <a:ext cx="12194344" cy="6863417"/>
+            <a:off x="122826" y="341200"/>
+            <a:ext cx="11932693" cy="6001643"/>
           </a:xfrm>
           <a:prstGeom prst="rect">
             <a:avLst/>
@@ -4321,19 +4417,19 @@
           <a:p>
             <a:pPr algn="ctr"/>
             <a:r>
-              <a:rPr lang="fr-FR" sz="8800" b="1" i="0" dirty="0" err="1">
-                <a:effectLst>
-                  <a:outerShdw blurRad="38100" dist="38100" dir="2700000" algn="tl">
-                    <a:srgbClr val="000000">
-                      <a:alpha val="43137"/>
-                    </a:srgbClr>
-                  </a:outerShdw>
-                </a:effectLst>
-              </a:rPr>
-              <a:t>Isaoranay</a:t>
-            </a:r>
-            <a:r>
-              <a:rPr lang="fr-FR" sz="8800" b="1" i="0" dirty="0">
+              <a:rPr lang="fr-FR" sz="9600" b="1" i="0" dirty="0" err="1" smtClean="0">
+                <a:effectLst>
+                  <a:outerShdw blurRad="38100" dist="38100" dir="2700000" algn="tl">
+                    <a:srgbClr val="000000">
+                      <a:alpha val="43137"/>
+                    </a:srgbClr>
+                  </a:outerShdw>
+                </a:effectLst>
+              </a:rPr>
+              <a:t>Ny</a:t>
+            </a:r>
+            <a:r>
+              <a:rPr lang="fr-FR" sz="9600" b="1" i="0" dirty="0" smtClean="0">
                 <a:effectLst>
                   <a:outerShdw blurRad="38100" dist="38100" dir="2700000" algn="tl">
                     <a:srgbClr val="000000">
@@ -4345,7 +4441,106 @@
               <a:t> </a:t>
             </a:r>
             <a:r>
-              <a:rPr lang="fr-FR" sz="8800" b="1" i="0" dirty="0" err="1">
+              <a:rPr lang="fr-FR" sz="9600" b="1" i="0" dirty="0" err="1">
+                <a:effectLst>
+                  <a:outerShdw blurRad="38100" dist="38100" dir="2700000" algn="tl">
+                    <a:srgbClr val="000000">
+                      <a:alpha val="43137"/>
+                    </a:srgbClr>
+                  </a:outerShdw>
+                </a:effectLst>
+              </a:rPr>
+              <a:t>tany</a:t>
+            </a:r>
+            <a:r>
+              <a:rPr lang="fr-FR" sz="9600" b="1" i="0" dirty="0">
+                <a:effectLst>
+                  <a:outerShdw blurRad="38100" dist="38100" dir="2700000" algn="tl">
+                    <a:srgbClr val="000000">
+                      <a:alpha val="43137"/>
+                    </a:srgbClr>
+                  </a:outerShdw>
+                </a:effectLst>
+              </a:rPr>
+              <a:t> </a:t>
+            </a:r>
+            <a:r>
+              <a:rPr lang="fr-FR" sz="9600" b="1" i="0" dirty="0" err="1">
+                <a:effectLst>
+                  <a:outerShdw blurRad="38100" dist="38100" dir="2700000" algn="tl">
+                    <a:srgbClr val="000000">
+                      <a:alpha val="43137"/>
+                    </a:srgbClr>
+                  </a:outerShdw>
+                </a:effectLst>
+              </a:rPr>
+              <a:t>aty</a:t>
+            </a:r>
+            <a:r>
+              <a:rPr lang="fr-FR" sz="9600" b="1" i="0" dirty="0">
+                <a:effectLst>
+                  <a:outerShdw blurRad="38100" dist="38100" dir="2700000" algn="tl">
+                    <a:srgbClr val="000000">
+                      <a:alpha val="43137"/>
+                    </a:srgbClr>
+                  </a:outerShdw>
+                </a:effectLst>
+              </a:rPr>
+              <a:t> </a:t>
+            </a:r>
+            <a:r>
+              <a:rPr lang="fr-FR" sz="9600" b="1" i="0" dirty="0" err="1">
+                <a:effectLst>
+                  <a:outerShdw blurRad="38100" dist="38100" dir="2700000" algn="tl">
+                    <a:srgbClr val="000000">
+                      <a:alpha val="43137"/>
+                    </a:srgbClr>
+                  </a:outerShdw>
+                </a:effectLst>
+              </a:rPr>
+              <a:t>mandray</a:t>
+            </a:r>
+            <a:r>
+              <a:rPr lang="fr-FR" sz="9600" b="1" i="0" dirty="0">
+                <a:effectLst>
+                  <a:outerShdw blurRad="38100" dist="38100" dir="2700000" algn="tl">
+                    <a:srgbClr val="000000">
+                      <a:alpha val="43137"/>
+                    </a:srgbClr>
+                  </a:outerShdw>
+                </a:effectLst>
+              </a:rPr>
+              <a:t> </a:t>
+            </a:r>
+            <a:r>
+              <a:rPr lang="fr-FR" sz="9600" b="1" i="0" dirty="0" err="1">
+                <a:effectLst>
+                  <a:outerShdw blurRad="38100" dist="38100" dir="2700000" algn="tl">
+                    <a:srgbClr val="000000">
+                      <a:alpha val="43137"/>
+                    </a:srgbClr>
+                  </a:outerShdw>
+                </a:effectLst>
+              </a:rPr>
+              <a:t>fitahiana</a:t>
+            </a:r>
+            <a:r>
+              <a:rPr lang="fr-FR" sz="9600" b="1" i="0" dirty="0">
+                <a:effectLst>
+                  <a:outerShdw blurRad="38100" dist="38100" dir="2700000" algn="tl">
+                    <a:srgbClr val="000000">
+                      <a:alpha val="43137"/>
+                    </a:srgbClr>
+                  </a:outerShdw>
+                </a:effectLst>
+              </a:rPr>
+              <a:t>; </a:t>
+            </a:r>
+          </a:p>
+          <a:p>
+            <a:pPr algn="ctr"/>
+            <a:r>
+              <a:rPr lang="fr-FR" sz="9600" b="1" i="0" dirty="0" err="1">
                 <a:effectLst>
                   <a:outerShdw blurRad="38100" dist="38100" dir="2700000" algn="tl">
                     <a:srgbClr val="000000">
@@ -4357,7 +4552,7 @@
               <a:t>ny</a:t>
             </a:r>
             <a:r>
-              <a:rPr lang="fr-FR" sz="8800" b="1" i="0" dirty="0">
+              <a:rPr lang="fr-FR" sz="9600" b="1" i="0" dirty="0">
                 <a:effectLst>
                   <a:outerShdw blurRad="38100" dist="38100" dir="2700000" algn="tl">
                     <a:srgbClr val="000000">
@@ -4369,43 +4564,19 @@
               <a:t> </a:t>
             </a:r>
             <a:r>
-              <a:rPr lang="fr-FR" sz="8800" b="1" i="0" dirty="0" err="1">
-                <a:effectLst>
-                  <a:outerShdw blurRad="38100" dist="38100" dir="2700000" algn="tl">
-                    <a:srgbClr val="000000">
-                      <a:alpha val="43137"/>
-                    </a:srgbClr>
-                  </a:outerShdw>
-                </a:effectLst>
-              </a:rPr>
-              <a:t>Tomponay</a:t>
-            </a:r>
-            <a:r>
-              <a:rPr lang="fr-FR" sz="8800" b="1" i="0" dirty="0">
-                <a:effectLst>
-                  <a:outerShdw blurRad="38100" dist="38100" dir="2700000" algn="tl">
-                    <a:srgbClr val="000000">
-                      <a:alpha val="43137"/>
-                    </a:srgbClr>
-                  </a:outerShdw>
-                </a:effectLst>
-              </a:rPr>
-              <a:t>. Ny </a:t>
-            </a:r>
-            <a:r>
-              <a:rPr lang="fr-FR" sz="8800" b="1" i="0" dirty="0" err="1">
-                <a:effectLst>
-                  <a:outerShdw blurRad="38100" dist="38100" dir="2700000" algn="tl">
-                    <a:srgbClr val="000000">
-                      <a:alpha val="43137"/>
-                    </a:srgbClr>
-                  </a:outerShdw>
-                </a:effectLst>
-              </a:rPr>
-              <a:t>tany</a:t>
-            </a:r>
-            <a:r>
-              <a:rPr lang="fr-FR" sz="8800" b="1" i="0" dirty="0">
+              <a:rPr lang="fr-FR" sz="9600" b="1" i="0" dirty="0" err="1">
+                <a:effectLst>
+                  <a:outerShdw blurRad="38100" dist="38100" dir="2700000" algn="tl">
+                    <a:srgbClr val="000000">
+                      <a:alpha val="43137"/>
+                    </a:srgbClr>
+                  </a:outerShdw>
+                </a:effectLst>
+              </a:rPr>
+              <a:t>lanitra</a:t>
+            </a:r>
+            <a:r>
+              <a:rPr lang="fr-FR" sz="9600" b="1" i="0" dirty="0">
                 <a:effectLst>
                   <a:outerShdw blurRad="38100" dist="38100" dir="2700000" algn="tl">
                     <a:srgbClr val="000000">
@@ -4417,19 +4588,19 @@
               <a:t> </a:t>
             </a:r>
             <a:r>
-              <a:rPr lang="fr-FR" sz="8800" b="1" i="0" dirty="0" err="1">
-                <a:effectLst>
-                  <a:outerShdw blurRad="38100" dist="38100" dir="2700000" algn="tl">
-                    <a:srgbClr val="000000">
-                      <a:alpha val="43137"/>
-                    </a:srgbClr>
-                  </a:outerShdw>
-                </a:effectLst>
-              </a:rPr>
-              <a:t>aty</a:t>
-            </a:r>
-            <a:r>
-              <a:rPr lang="fr-FR" sz="8800" b="1" i="0" dirty="0">
+              <a:rPr lang="fr-FR" sz="9600" b="1" i="0" dirty="0" err="1">
+                <a:effectLst>
+                  <a:outerShdw blurRad="38100" dist="38100" dir="2700000" algn="tl">
+                    <a:srgbClr val="000000">
+                      <a:alpha val="43137"/>
+                    </a:srgbClr>
+                  </a:outerShdw>
+                </a:effectLst>
+              </a:rPr>
+              <a:t>ary</a:t>
+            </a:r>
+            <a:r>
+              <a:rPr lang="fr-FR" sz="9600" b="1" i="0" dirty="0">
                 <a:effectLst>
                   <a:outerShdw blurRad="38100" dist="38100" dir="2700000" algn="tl">
                     <a:srgbClr val="000000">
@@ -4441,19 +4612,19 @@
               <a:t> </a:t>
             </a:r>
             <a:r>
-              <a:rPr lang="fr-FR" sz="8800" b="1" i="0" dirty="0" err="1">
-                <a:effectLst>
-                  <a:outerShdw blurRad="38100" dist="38100" dir="2700000" algn="tl">
-                    <a:srgbClr val="000000">
-                      <a:alpha val="43137"/>
-                    </a:srgbClr>
-                  </a:outerShdw>
-                </a:effectLst>
-              </a:rPr>
-              <a:t>mandray</a:t>
-            </a:r>
-            <a:r>
-              <a:rPr lang="fr-FR" sz="8800" b="1" i="0" dirty="0">
+              <a:rPr lang="fr-FR" sz="9600" b="1" i="0" dirty="0" err="1">
+                <a:effectLst>
+                  <a:outerShdw blurRad="38100" dist="38100" dir="2700000" algn="tl">
+                    <a:srgbClr val="000000">
+                      <a:alpha val="43137"/>
+                    </a:srgbClr>
+                  </a:outerShdw>
+                </a:effectLst>
+              </a:rPr>
+              <a:t>mamoaka</a:t>
+            </a:r>
+            <a:r>
+              <a:rPr lang="fr-FR" sz="9600" b="1" i="0" dirty="0">
                 <a:effectLst>
                   <a:outerShdw blurRad="38100" dist="38100" dir="2700000" algn="tl">
                     <a:srgbClr val="000000">
@@ -4465,34 +4636,7 @@
               <a:t> </a:t>
             </a:r>
             <a:r>
-              <a:rPr lang="fr-FR" sz="8800" b="1" i="0" dirty="0" err="1">
-                <a:effectLst>
-                  <a:outerShdw blurRad="38100" dist="38100" dir="2700000" algn="tl">
-                    <a:srgbClr val="000000">
-                      <a:alpha val="43137"/>
-                    </a:srgbClr>
-                  </a:outerShdw>
-                </a:effectLst>
-              </a:rPr>
-              <a:t>fitahiana</a:t>
-            </a:r>
-            <a:r>
-              <a:rPr lang="fr-FR" sz="8800" b="1" i="0" dirty="0">
-                <a:effectLst>
-                  <a:outerShdw blurRad="38100" dist="38100" dir="2700000" algn="tl">
-                    <a:srgbClr val="000000">
-                      <a:alpha val="43137"/>
-                    </a:srgbClr>
-                  </a:outerShdw>
-                </a:effectLst>
-              </a:rPr>
-              <a:t>; </a:t>
-            </a:r>
-          </a:p>
-          <a:p>
-            <a:pPr algn="ctr"/>
-            <a:r>
-              <a:rPr lang="fr-FR" sz="8800" b="1" i="0" dirty="0" err="1">
+              <a:rPr lang="fr-FR" sz="9600" b="1" i="0" dirty="0" err="1">
                 <a:effectLst>
                   <a:outerShdw blurRad="38100" dist="38100" dir="2700000" algn="tl">
                     <a:srgbClr val="000000">
@@ -4504,7 +4648,7 @@
               <a:t>ny</a:t>
             </a:r>
             <a:r>
-              <a:rPr lang="fr-FR" sz="8800" b="1" i="0" dirty="0">
+              <a:rPr lang="fr-FR" sz="9600" b="1" i="0" dirty="0">
                 <a:effectLst>
                   <a:outerShdw blurRad="38100" dist="38100" dir="2700000" algn="tl">
                     <a:srgbClr val="000000">
@@ -4516,103 +4660,7 @@
               <a:t> </a:t>
             </a:r>
             <a:r>
-              <a:rPr lang="fr-FR" sz="8800" b="1" i="0" dirty="0" err="1">
-                <a:effectLst>
-                  <a:outerShdw blurRad="38100" dist="38100" dir="2700000" algn="tl">
-                    <a:srgbClr val="000000">
-                      <a:alpha val="43137"/>
-                    </a:srgbClr>
-                  </a:outerShdw>
-                </a:effectLst>
-              </a:rPr>
-              <a:t>lanitra</a:t>
-            </a:r>
-            <a:r>
-              <a:rPr lang="fr-FR" sz="8800" b="1" i="0" dirty="0">
-                <a:effectLst>
-                  <a:outerShdw blurRad="38100" dist="38100" dir="2700000" algn="tl">
-                    <a:srgbClr val="000000">
-                      <a:alpha val="43137"/>
-                    </a:srgbClr>
-                  </a:outerShdw>
-                </a:effectLst>
-              </a:rPr>
-              <a:t> </a:t>
-            </a:r>
-            <a:r>
-              <a:rPr lang="fr-FR" sz="8800" b="1" i="0" dirty="0" err="1">
-                <a:effectLst>
-                  <a:outerShdw blurRad="38100" dist="38100" dir="2700000" algn="tl">
-                    <a:srgbClr val="000000">
-                      <a:alpha val="43137"/>
-                    </a:srgbClr>
-                  </a:outerShdw>
-                </a:effectLst>
-              </a:rPr>
-              <a:t>ary</a:t>
-            </a:r>
-            <a:r>
-              <a:rPr lang="fr-FR" sz="8800" b="1" i="0" dirty="0">
-                <a:effectLst>
-                  <a:outerShdw blurRad="38100" dist="38100" dir="2700000" algn="tl">
-                    <a:srgbClr val="000000">
-                      <a:alpha val="43137"/>
-                    </a:srgbClr>
-                  </a:outerShdw>
-                </a:effectLst>
-              </a:rPr>
-              <a:t> </a:t>
-            </a:r>
-            <a:r>
-              <a:rPr lang="fr-FR" sz="8800" b="1" i="0" dirty="0" err="1">
-                <a:effectLst>
-                  <a:outerShdw blurRad="38100" dist="38100" dir="2700000" algn="tl">
-                    <a:srgbClr val="000000">
-                      <a:alpha val="43137"/>
-                    </a:srgbClr>
-                  </a:outerShdw>
-                </a:effectLst>
-              </a:rPr>
-              <a:t>mamoaka</a:t>
-            </a:r>
-            <a:r>
-              <a:rPr lang="fr-FR" sz="8800" b="1" i="0" dirty="0">
-                <a:effectLst>
-                  <a:outerShdw blurRad="38100" dist="38100" dir="2700000" algn="tl">
-                    <a:srgbClr val="000000">
-                      <a:alpha val="43137"/>
-                    </a:srgbClr>
-                  </a:outerShdw>
-                </a:effectLst>
-              </a:rPr>
-              <a:t> </a:t>
-            </a:r>
-            <a:r>
-              <a:rPr lang="fr-FR" sz="8800" b="1" i="0" dirty="0" err="1">
-                <a:effectLst>
-                  <a:outerShdw blurRad="38100" dist="38100" dir="2700000" algn="tl">
-                    <a:srgbClr val="000000">
-                      <a:alpha val="43137"/>
-                    </a:srgbClr>
-                  </a:outerShdw>
-                </a:effectLst>
-              </a:rPr>
-              <a:t>ny</a:t>
-            </a:r>
-            <a:r>
-              <a:rPr lang="fr-FR" sz="8800" b="1" i="0" dirty="0">
-                <a:effectLst>
-                  <a:outerShdw blurRad="38100" dist="38100" dir="2700000" algn="tl">
-                    <a:srgbClr val="000000">
-                      <a:alpha val="43137"/>
-                    </a:srgbClr>
-                  </a:outerShdw>
-                </a:effectLst>
-              </a:rPr>
-              <a:t> </a:t>
-            </a:r>
-            <a:r>
-              <a:rPr lang="fr-FR" sz="8800" b="1" i="0" dirty="0" err="1">
+              <a:rPr lang="fr-FR" sz="9600" b="1" i="0" dirty="0" err="1">
                 <a:effectLst>
                   <a:outerShdw blurRad="38100" dist="38100" dir="2700000" algn="tl">
                     <a:srgbClr val="000000">
@@ -4624,7 +4672,7 @@
               <a:t>soa</a:t>
             </a:r>
             <a:r>
-              <a:rPr lang="fr-FR" sz="8800" b="1" i="0" dirty="0">
+              <a:rPr lang="fr-FR" sz="9600" b="1" i="0" dirty="0">
                 <a:effectLst>
                   <a:outerShdw blurRad="38100" dist="38100" dir="2700000" algn="tl">
                     <a:srgbClr val="000000">
@@ -4635,7 +4683,7 @@
               </a:rPr>
               <a:t>, </a:t>
             </a:r>
-            <a:endParaRPr lang="fr-FR" sz="8800" dirty="0"/>
+            <a:endParaRPr lang="fr-FR" sz="9600" dirty="0"/>
           </a:p>
         </p:txBody>
       </p:sp>
@@ -4674,7 +4722,7 @@
           <p:cNvPr id="3" name="ZoneTexte 2">
             <a:extLst>
               <a:ext uri="{FF2B5EF4-FFF2-40B4-BE49-F238E27FC236}">
-                <a16:creationId xmlns:a16="http://schemas.microsoft.com/office/drawing/2014/main" id="{A4D464B9-4376-21D4-F726-01FD307DD385}"/>
+                <a16:creationId xmlns:a16="http://schemas.microsoft.com/office/drawing/2014/main" xmlns="" id="{A4D464B9-4376-21D4-F726-01FD307DD385}"/>
               </a:ext>
             </a:extLst>
           </p:cNvPr>
@@ -4968,7 +5016,7 @@
           <p:cNvPr id="3" name="ZoneTexte 2">
             <a:extLst>
               <a:ext uri="{FF2B5EF4-FFF2-40B4-BE49-F238E27FC236}">
-                <a16:creationId xmlns:a16="http://schemas.microsoft.com/office/drawing/2014/main" id="{DD954761-3076-D112-2763-1F5231ED49DE}"/>
+                <a16:creationId xmlns:a16="http://schemas.microsoft.com/office/drawing/2014/main" xmlns="" id="{DD954761-3076-D112-2763-1F5231ED49DE}"/>
               </a:ext>
             </a:extLst>
           </p:cNvPr>
@@ -5271,7 +5319,7 @@
           <p:cNvPr id="3" name="ZoneTexte 2">
             <a:extLst>
               <a:ext uri="{FF2B5EF4-FFF2-40B4-BE49-F238E27FC236}">
-                <a16:creationId xmlns:a16="http://schemas.microsoft.com/office/drawing/2014/main" id="{EBDEE945-18CF-0895-DA9C-860D390C6809}"/>
+                <a16:creationId xmlns:a16="http://schemas.microsoft.com/office/drawing/2014/main" xmlns="" id="{EBDEE945-18CF-0895-DA9C-860D390C6809}"/>
               </a:ext>
             </a:extLst>
           </p:cNvPr>
@@ -5280,7 +5328,7 @@
         </p:nvSpPr>
         <p:spPr>
           <a:xfrm>
-            <a:off x="-2344" y="0"/>
+            <a:off x="-2344" y="532266"/>
             <a:ext cx="12194344" cy="5401479"/>
           </a:xfrm>
           <a:prstGeom prst="rect">

</xml_diff>